<commit_message>
Replace Abschlusspräsentation zum Bachelor-Praktikum.pptx
</commit_message>
<xml_diff>
--- a/Abschlusspräsentation zum Bachelor-Praktikum.pptx
+++ b/Abschlusspräsentation zum Bachelor-Praktikum.pptx
@@ -8,8 +8,8 @@
     <p:sldId id="256" r:id="rId2"/>
     <p:sldId id="257" r:id="rId3"/>
     <p:sldId id="262" r:id="rId4"/>
-    <p:sldId id="265" r:id="rId5"/>
-    <p:sldId id="263" r:id="rId6"/>
+    <p:sldId id="263" r:id="rId5"/>
+    <p:sldId id="265" r:id="rId6"/>
     <p:sldId id="264" r:id="rId7"/>
     <p:sldId id="259" r:id="rId8"/>
     <p:sldId id="258" r:id="rId9"/>
@@ -268,7 +268,7 @@
           <a:p>
             <a:fld id="{51600CC8-C44B-446B-BC4E-25F9749EB018}" type="datetimeFigureOut">
               <a:rPr lang="de-DE" smtClean="0"/>
-              <a:t>28.02.2021</a:t>
+              <a:t>01.03.2021</a:t>
             </a:fld>
             <a:endParaRPr lang="de-DE"/>
           </a:p>
@@ -466,7 +466,7 @@
           <a:p>
             <a:fld id="{51600CC8-C44B-446B-BC4E-25F9749EB018}" type="datetimeFigureOut">
               <a:rPr lang="de-DE" smtClean="0"/>
-              <a:t>28.02.2021</a:t>
+              <a:t>01.03.2021</a:t>
             </a:fld>
             <a:endParaRPr lang="de-DE"/>
           </a:p>
@@ -674,7 +674,7 @@
           <a:p>
             <a:fld id="{51600CC8-C44B-446B-BC4E-25F9749EB018}" type="datetimeFigureOut">
               <a:rPr lang="de-DE" smtClean="0"/>
-              <a:t>28.02.2021</a:t>
+              <a:t>01.03.2021</a:t>
             </a:fld>
             <a:endParaRPr lang="de-DE"/>
           </a:p>
@@ -872,7 +872,7 @@
           <a:p>
             <a:fld id="{51600CC8-C44B-446B-BC4E-25F9749EB018}" type="datetimeFigureOut">
               <a:rPr lang="de-DE" smtClean="0"/>
-              <a:t>28.02.2021</a:t>
+              <a:t>01.03.2021</a:t>
             </a:fld>
             <a:endParaRPr lang="de-DE"/>
           </a:p>
@@ -1147,7 +1147,7 @@
           <a:p>
             <a:fld id="{51600CC8-C44B-446B-BC4E-25F9749EB018}" type="datetimeFigureOut">
               <a:rPr lang="de-DE" smtClean="0"/>
-              <a:t>28.02.2021</a:t>
+              <a:t>01.03.2021</a:t>
             </a:fld>
             <a:endParaRPr lang="de-DE"/>
           </a:p>
@@ -1412,7 +1412,7 @@
           <a:p>
             <a:fld id="{51600CC8-C44B-446B-BC4E-25F9749EB018}" type="datetimeFigureOut">
               <a:rPr lang="de-DE" smtClean="0"/>
-              <a:t>28.02.2021</a:t>
+              <a:t>01.03.2021</a:t>
             </a:fld>
             <a:endParaRPr lang="de-DE"/>
           </a:p>
@@ -1824,7 +1824,7 @@
           <a:p>
             <a:fld id="{51600CC8-C44B-446B-BC4E-25F9749EB018}" type="datetimeFigureOut">
               <a:rPr lang="de-DE" smtClean="0"/>
-              <a:t>28.02.2021</a:t>
+              <a:t>01.03.2021</a:t>
             </a:fld>
             <a:endParaRPr lang="de-DE"/>
           </a:p>
@@ -1965,7 +1965,7 @@
           <a:p>
             <a:fld id="{51600CC8-C44B-446B-BC4E-25F9749EB018}" type="datetimeFigureOut">
               <a:rPr lang="de-DE" smtClean="0"/>
-              <a:t>28.02.2021</a:t>
+              <a:t>01.03.2021</a:t>
             </a:fld>
             <a:endParaRPr lang="de-DE"/>
           </a:p>
@@ -2078,7 +2078,7 @@
           <a:p>
             <a:fld id="{51600CC8-C44B-446B-BC4E-25F9749EB018}" type="datetimeFigureOut">
               <a:rPr lang="de-DE" smtClean="0"/>
-              <a:t>28.02.2021</a:t>
+              <a:t>01.03.2021</a:t>
             </a:fld>
             <a:endParaRPr lang="de-DE"/>
           </a:p>
@@ -2389,7 +2389,7 @@
           <a:p>
             <a:fld id="{51600CC8-C44B-446B-BC4E-25F9749EB018}" type="datetimeFigureOut">
               <a:rPr lang="de-DE" smtClean="0"/>
-              <a:t>28.02.2021</a:t>
+              <a:t>01.03.2021</a:t>
             </a:fld>
             <a:endParaRPr lang="de-DE"/>
           </a:p>
@@ -2677,7 +2677,7 @@
           <a:p>
             <a:fld id="{51600CC8-C44B-446B-BC4E-25F9749EB018}" type="datetimeFigureOut">
               <a:rPr lang="de-DE" smtClean="0"/>
-              <a:t>28.02.2021</a:t>
+              <a:t>01.03.2021</a:t>
             </a:fld>
             <a:endParaRPr lang="de-DE"/>
           </a:p>
@@ -2918,7 +2918,7 @@
           <a:p>
             <a:fld id="{51600CC8-C44B-446B-BC4E-25F9749EB018}" type="datetimeFigureOut">
               <a:rPr lang="de-DE" smtClean="0"/>
-              <a:t>28.02.2021</a:t>
+              <a:t>01.03.2021</a:t>
             </a:fld>
             <a:endParaRPr lang="de-DE"/>
           </a:p>
@@ -3337,6 +3337,114 @@
       </p:grpSpPr>
       <p:sp>
         <p:nvSpPr>
+          <p:cNvPr id="8" name="Rechteck 7">
+            <a:extLst>
+              <a:ext uri="{FF2B5EF4-FFF2-40B4-BE49-F238E27FC236}">
+                <a16:creationId xmlns:a16="http://schemas.microsoft.com/office/drawing/2014/main" id="{65BD1A5A-178D-4386-8449-5D9D92A3A1FF}"/>
+              </a:ext>
+            </a:extLst>
+          </p:cNvPr>
+          <p:cNvSpPr/>
+          <p:nvPr/>
+        </p:nvSpPr>
+        <p:spPr>
+          <a:xfrm>
+            <a:off x="5705474" y="4610099"/>
+            <a:ext cx="8562975" cy="1655762"/>
+          </a:xfrm>
+          <a:prstGeom prst="rect">
+            <a:avLst/>
+          </a:prstGeom>
+          <a:solidFill>
+            <a:srgbClr val="009E6F"/>
+          </a:solidFill>
+          <a:ln>
+            <a:solidFill>
+              <a:srgbClr val="009E6F"/>
+            </a:solidFill>
+          </a:ln>
+        </p:spPr>
+        <p:style>
+          <a:lnRef idx="2">
+            <a:schemeClr val="accent1">
+              <a:shade val="50000"/>
+            </a:schemeClr>
+          </a:lnRef>
+          <a:fillRef idx="1">
+            <a:schemeClr val="accent1"/>
+          </a:fillRef>
+          <a:effectRef idx="0">
+            <a:schemeClr val="accent1"/>
+          </a:effectRef>
+          <a:fontRef idx="minor">
+            <a:schemeClr val="lt1"/>
+          </a:fontRef>
+        </p:style>
+        <p:txBody>
+          <a:bodyPr rtlCol="0" anchor="ctr"/>
+          <a:lstStyle/>
+          <a:p>
+            <a:pPr algn="ctr"/>
+            <a:endParaRPr lang="de-DE"/>
+          </a:p>
+        </p:txBody>
+      </p:sp>
+      <p:sp>
+        <p:nvSpPr>
+          <p:cNvPr id="6" name="Rechteck 5">
+            <a:extLst>
+              <a:ext uri="{FF2B5EF4-FFF2-40B4-BE49-F238E27FC236}">
+                <a16:creationId xmlns:a16="http://schemas.microsoft.com/office/drawing/2014/main" id="{8B827A11-79D8-48D3-95CF-0E0EA77B34F5}"/>
+              </a:ext>
+            </a:extLst>
+          </p:cNvPr>
+          <p:cNvSpPr/>
+          <p:nvPr/>
+        </p:nvSpPr>
+        <p:spPr>
+          <a:xfrm>
+            <a:off x="-190500" y="923925"/>
+            <a:ext cx="9829800" cy="2303463"/>
+          </a:xfrm>
+          <a:prstGeom prst="rect">
+            <a:avLst/>
+          </a:prstGeom>
+          <a:solidFill>
+            <a:srgbClr val="009E6F"/>
+          </a:solidFill>
+          <a:ln>
+            <a:solidFill>
+              <a:srgbClr val="009E6F"/>
+            </a:solidFill>
+          </a:ln>
+        </p:spPr>
+        <p:style>
+          <a:lnRef idx="2">
+            <a:schemeClr val="accent1">
+              <a:shade val="50000"/>
+            </a:schemeClr>
+          </a:lnRef>
+          <a:fillRef idx="1">
+            <a:schemeClr val="accent1"/>
+          </a:fillRef>
+          <a:effectRef idx="0">
+            <a:schemeClr val="accent1"/>
+          </a:effectRef>
+          <a:fontRef idx="minor">
+            <a:schemeClr val="lt1"/>
+          </a:fontRef>
+        </p:style>
+        <p:txBody>
+          <a:bodyPr rtlCol="0" anchor="ctr"/>
+          <a:lstStyle/>
+          <a:p>
+            <a:pPr algn="ctr"/>
+            <a:endParaRPr lang="de-DE"/>
+          </a:p>
+        </p:txBody>
+      </p:sp>
+      <p:sp>
+        <p:nvSpPr>
           <p:cNvPr id="2" name="Titel 1">
             <a:extLst>
               <a:ext uri="{FF2B5EF4-FFF2-40B4-BE49-F238E27FC236}">
@@ -3351,14 +3459,43 @@
             <p:ph type="ctrTitle"/>
           </p:nvPr>
         </p:nvSpPr>
-        <p:spPr/>
-        <p:txBody>
-          <a:bodyPr/>
-          <a:lstStyle/>
-          <a:p>
-            <a:r>
-              <a:rPr lang="de-DE" dirty="0"/>
-              <a:t>Abschlusspräsentation zum Bachelor-Praktikum</a:t>
+        <p:spPr>
+          <a:xfrm>
+            <a:off x="909637" y="1285081"/>
+            <a:ext cx="7629525" cy="1581150"/>
+          </a:xfrm>
+        </p:spPr>
+        <p:txBody>
+          <a:bodyPr>
+            <a:noAutofit/>
+          </a:bodyPr>
+          <a:lstStyle/>
+          <a:p>
+            <a:r>
+              <a:rPr lang="de-DE" sz="4800" dirty="0">
+                <a:solidFill>
+                  <a:schemeClr val="bg1"/>
+                </a:solidFill>
+                <a:latin typeface="Trebuchet MS" panose="020B0603020202020204" pitchFamily="34" charset="0"/>
+              </a:rPr>
+              <a:t>Abschlusspräsentation zum </a:t>
+            </a:r>
+            <a:br>
+              <a:rPr lang="de-DE" sz="4800" dirty="0">
+                <a:solidFill>
+                  <a:schemeClr val="bg1"/>
+                </a:solidFill>
+                <a:latin typeface="Trebuchet MS" panose="020B0603020202020204" pitchFamily="34" charset="0"/>
+              </a:rPr>
+            </a:br>
+            <a:r>
+              <a:rPr lang="de-DE" sz="4800" dirty="0">
+                <a:solidFill>
+                  <a:schemeClr val="bg1"/>
+                </a:solidFill>
+                <a:latin typeface="Trebuchet MS" panose="020B0603020202020204" pitchFamily="34" charset="0"/>
+              </a:rPr>
+              <a:t>Bachelor-Praktikum</a:t>
             </a:r>
           </a:p>
         </p:txBody>
@@ -3379,22 +3516,36 @@
             <p:ph type="subTitle" idx="1"/>
           </p:nvPr>
         </p:nvSpPr>
-        <p:spPr/>
+        <p:spPr>
+          <a:xfrm>
+            <a:off x="6096000" y="4910931"/>
+            <a:ext cx="5919787" cy="1323975"/>
+          </a:xfrm>
+        </p:spPr>
         <p:txBody>
           <a:bodyPr/>
           <a:lstStyle/>
           <a:p>
             <a:r>
-              <a:rPr lang="de-DE" sz="3200" dirty="0"/>
+              <a:rPr lang="de-DE" sz="3200" dirty="0">
+                <a:solidFill>
+                  <a:schemeClr val="bg1"/>
+                </a:solidFill>
+                <a:latin typeface="Trebuchet MS" panose="020B0603020202020204" pitchFamily="34" charset="0"/>
+              </a:rPr>
               <a:t>Pandemiesimulator</a:t>
             </a:r>
           </a:p>
           <a:p>
             <a:r>
-              <a:rPr lang="de-DE" sz="3200"/>
-              <a:t>Jonas Adler</a:t>
-            </a:r>
-            <a:endParaRPr lang="de-DE" sz="3200" dirty="0"/>
+              <a:rPr lang="de-DE" sz="3200" dirty="0">
+                <a:solidFill>
+                  <a:schemeClr val="bg1"/>
+                </a:solidFill>
+                <a:latin typeface="Trebuchet MS" panose="020B0603020202020204" pitchFamily="34" charset="0"/>
+              </a:rPr>
+              <a:t>Jonas Adler WS 2020/21</a:t>
+            </a:r>
           </a:p>
         </p:txBody>
       </p:sp>
@@ -3430,34 +3581,6 @@
       </p:grpSpPr>
       <p:sp>
         <p:nvSpPr>
-          <p:cNvPr id="2" name="Titel 1">
-            <a:extLst>
-              <a:ext uri="{FF2B5EF4-FFF2-40B4-BE49-F238E27FC236}">
-                <a16:creationId xmlns:a16="http://schemas.microsoft.com/office/drawing/2014/main" id="{2239079D-816C-4483-9D6A-81A0C9ADCA6E}"/>
-              </a:ext>
-            </a:extLst>
-          </p:cNvPr>
-          <p:cNvSpPr>
-            <a:spLocks noGrp="1"/>
-          </p:cNvSpPr>
-          <p:nvPr>
-            <p:ph type="title"/>
-          </p:nvPr>
-        </p:nvSpPr>
-        <p:spPr/>
-        <p:txBody>
-          <a:bodyPr/>
-          <a:lstStyle/>
-          <a:p>
-            <a:r>
-              <a:rPr lang="de-DE" dirty="0"/>
-              <a:t>Erweiterungsmöglichkeiten</a:t>
-            </a:r>
-          </a:p>
-        </p:txBody>
-      </p:sp>
-      <p:sp>
-        <p:nvSpPr>
           <p:cNvPr id="3" name="Inhaltsplatzhalter 2">
             <a:extLst>
               <a:ext uri="{FF2B5EF4-FFF2-40B4-BE49-F238E27FC236}">
@@ -3472,38 +3595,263 @@
             <p:ph idx="1"/>
           </p:nvPr>
         </p:nvSpPr>
-        <p:spPr/>
-        <p:txBody>
-          <a:bodyPr/>
-          <a:lstStyle/>
-          <a:p>
-            <a:r>
-              <a:rPr lang="de-DE" dirty="0"/>
-              <a:t>Zufällig eines infizieren, wenn keiner mehr </a:t>
-            </a:r>
-            <a:r>
-              <a:rPr lang="de-DE" dirty="0" err="1"/>
-              <a:t>infected</a:t>
-            </a:r>
-            <a:endParaRPr lang="de-DE" dirty="0"/>
-          </a:p>
-          <a:p>
-            <a:r>
-              <a:rPr lang="de-DE" dirty="0"/>
+        <p:spPr>
+          <a:xfrm>
+            <a:off x="838200" y="1619249"/>
+            <a:ext cx="10515600" cy="4557713"/>
+          </a:xfrm>
+        </p:spPr>
+        <p:txBody>
+          <a:bodyPr>
+            <a:normAutofit/>
+          </a:bodyPr>
+          <a:lstStyle/>
+          <a:p>
+            <a:r>
+              <a:rPr lang="de-DE" sz="2400" dirty="0">
+                <a:latin typeface="Trebuchet MS" panose="020B0603020202020204" pitchFamily="34" charset="0"/>
+              </a:rPr>
               <a:t>Layout und Design</a:t>
             </a:r>
           </a:p>
           <a:p>
             <a:r>
-              <a:rPr lang="de-DE" dirty="0"/>
+              <a:rPr lang="de-DE" sz="2400" dirty="0">
+                <a:latin typeface="Trebuchet MS" panose="020B0603020202020204" pitchFamily="34" charset="0"/>
+              </a:rPr>
+              <a:t>Zufällige Neuinfektion, wenn keiner mehr infiziert</a:t>
+            </a:r>
+          </a:p>
+          <a:p>
+            <a:r>
+              <a:rPr lang="de-DE" sz="2400" dirty="0">
+                <a:latin typeface="Trebuchet MS" panose="020B0603020202020204" pitchFamily="34" charset="0"/>
+              </a:rPr>
               <a:t>Alter der Partikel</a:t>
             </a:r>
           </a:p>
           <a:p>
-            <a:r>
-              <a:rPr lang="de-DE" dirty="0"/>
+            <a:pPr lvl="1"/>
+            <a:r>
+              <a:rPr lang="de-DE" sz="2000" dirty="0">
+                <a:latin typeface="Trebuchet MS" panose="020B0603020202020204" pitchFamily="34" charset="0"/>
+              </a:rPr>
+              <a:t>Erhöhte Sterberate bei „älteren“ Partikeln</a:t>
+            </a:r>
+          </a:p>
+          <a:p>
+            <a:r>
+              <a:rPr lang="de-DE" sz="2400" dirty="0">
+                <a:latin typeface="Trebuchet MS" panose="020B0603020202020204" pitchFamily="34" charset="0"/>
+              </a:rPr>
               <a:t>Umrechnung des Abstands von „Pixel“ auf tatsächlicher Meter</a:t>
             </a:r>
+          </a:p>
+          <a:p>
+            <a:pPr lvl="1"/>
+            <a:r>
+              <a:rPr lang="de-DE" sz="2000" dirty="0">
+                <a:latin typeface="Trebuchet MS" panose="020B0603020202020204" pitchFamily="34" charset="0"/>
+              </a:rPr>
+              <a:t>Intuitiver</a:t>
+            </a:r>
+          </a:p>
+          <a:p>
+            <a:r>
+              <a:rPr lang="de-DE" sz="2400" dirty="0">
+                <a:latin typeface="Trebuchet MS" panose="020B0603020202020204" pitchFamily="34" charset="0"/>
+              </a:rPr>
+              <a:t>Weitere Einstellungsmöglichkeiten</a:t>
+            </a:r>
+          </a:p>
+          <a:p>
+            <a:pPr lvl="1"/>
+            <a:r>
+              <a:rPr lang="de-DE" sz="2000" dirty="0">
+                <a:latin typeface="Trebuchet MS" panose="020B0603020202020204" pitchFamily="34" charset="0"/>
+              </a:rPr>
+              <a:t>Wie viele pro Tag impfen?</a:t>
+            </a:r>
+          </a:p>
+          <a:p>
+            <a:pPr lvl="1"/>
+            <a:r>
+              <a:rPr lang="de-DE" sz="2000" dirty="0">
+                <a:latin typeface="Trebuchet MS" panose="020B0603020202020204" pitchFamily="34" charset="0"/>
+              </a:rPr>
+              <a:t>Abweichung der Infiziert-/Immun-Tage vom Schnitt</a:t>
+            </a:r>
+          </a:p>
+          <a:p>
+            <a:pPr lvl="1"/>
+            <a:r>
+              <a:rPr lang="de-DE" sz="2000" dirty="0">
+                <a:latin typeface="Trebuchet MS" panose="020B0603020202020204" pitchFamily="34" charset="0"/>
+              </a:rPr>
+              <a:t>Ein-/Ausstellen des „End-Screens“</a:t>
+            </a:r>
+          </a:p>
+        </p:txBody>
+      </p:sp>
+      <p:sp>
+        <p:nvSpPr>
+          <p:cNvPr id="4" name="Parallelogramm 3">
+            <a:extLst>
+              <a:ext uri="{FF2B5EF4-FFF2-40B4-BE49-F238E27FC236}">
+                <a16:creationId xmlns:a16="http://schemas.microsoft.com/office/drawing/2014/main" id="{C939153C-C3EF-4C48-A812-EE173415BDDA}"/>
+              </a:ext>
+            </a:extLst>
+          </p:cNvPr>
+          <p:cNvSpPr/>
+          <p:nvPr/>
+        </p:nvSpPr>
+        <p:spPr>
+          <a:xfrm>
+            <a:off x="-330764" y="320406"/>
+            <a:ext cx="3978839" cy="566960"/>
+          </a:xfrm>
+          <a:prstGeom prst="parallelogram">
+            <a:avLst/>
+          </a:prstGeom>
+          <a:solidFill>
+            <a:srgbClr val="009E6F"/>
+          </a:solidFill>
+          <a:ln>
+            <a:solidFill>
+              <a:srgbClr val="009E6F"/>
+            </a:solidFill>
+          </a:ln>
+        </p:spPr>
+        <p:style>
+          <a:lnRef idx="2">
+            <a:schemeClr val="accent6">
+              <a:shade val="50000"/>
+            </a:schemeClr>
+          </a:lnRef>
+          <a:fillRef idx="1">
+            <a:schemeClr val="accent6"/>
+          </a:fillRef>
+          <a:effectRef idx="0">
+            <a:schemeClr val="accent6"/>
+          </a:effectRef>
+          <a:fontRef idx="minor">
+            <a:schemeClr val="lt1"/>
+          </a:fontRef>
+        </p:style>
+        <p:txBody>
+          <a:bodyPr rtlCol="0" anchor="ctr"/>
+          <a:lstStyle/>
+          <a:p>
+            <a:pPr marL="0" marR="0" lvl="0" indent="0" algn="ctr" defTabSz="914400" rtl="0" eaLnBrk="1" fontAlgn="auto" latinLnBrk="0" hangingPunct="1">
+              <a:lnSpc>
+                <a:spcPct val="100000"/>
+              </a:lnSpc>
+              <a:spcBef>
+                <a:spcPts val="0"/>
+              </a:spcBef>
+              <a:spcAft>
+                <a:spcPts val="0"/>
+              </a:spcAft>
+              <a:buClrTx/>
+              <a:buSzTx/>
+              <a:buFontTx/>
+              <a:buNone/>
+              <a:tabLst/>
+              <a:defRPr/>
+            </a:pPr>
+            <a:endParaRPr kumimoji="0" lang="de-DE" sz="1800" b="0" i="0" u="none" strike="noStrike" kern="1200" cap="none" spc="0" normalizeH="0" baseline="0" noProof="0">
+              <a:ln>
+                <a:noFill/>
+              </a:ln>
+              <a:solidFill>
+                <a:prstClr val="white"/>
+              </a:solidFill>
+              <a:effectLst/>
+              <a:uLnTx/>
+              <a:uFillTx/>
+              <a:latin typeface="Calibri" panose="020F0502020204030204"/>
+              <a:ea typeface="+mn-ea"/>
+              <a:cs typeface="+mn-cs"/>
+            </a:endParaRPr>
+          </a:p>
+        </p:txBody>
+      </p:sp>
+      <p:sp>
+        <p:nvSpPr>
+          <p:cNvPr id="5" name="Textfeld 4">
+            <a:extLst>
+              <a:ext uri="{FF2B5EF4-FFF2-40B4-BE49-F238E27FC236}">
+                <a16:creationId xmlns:a16="http://schemas.microsoft.com/office/drawing/2014/main" id="{BEAB06A4-3D6E-414D-B900-81113E806B30}"/>
+              </a:ext>
+            </a:extLst>
+          </p:cNvPr>
+          <p:cNvSpPr txBox="1"/>
+          <p:nvPr/>
+        </p:nvSpPr>
+        <p:spPr>
+          <a:xfrm>
+            <a:off x="-93722" y="403831"/>
+            <a:ext cx="3504753" cy="400110"/>
+          </a:xfrm>
+          <a:prstGeom prst="rect">
+            <a:avLst/>
+          </a:prstGeom>
+          <a:noFill/>
+        </p:spPr>
+        <p:txBody>
+          <a:bodyPr wrap="square" rtlCol="0">
+            <a:spAutoFit/>
+          </a:bodyPr>
+          <a:lstStyle/>
+          <a:p>
+            <a:pPr marL="0" marR="0" lvl="0" indent="0" algn="ctr" defTabSz="914400" rtl="0" eaLnBrk="1" fontAlgn="auto" latinLnBrk="0" hangingPunct="1">
+              <a:lnSpc>
+                <a:spcPct val="100000"/>
+              </a:lnSpc>
+              <a:spcBef>
+                <a:spcPts val="0"/>
+              </a:spcBef>
+              <a:spcAft>
+                <a:spcPts val="0"/>
+              </a:spcAft>
+              <a:buClrTx/>
+              <a:buSzTx/>
+              <a:buFontTx/>
+              <a:buNone/>
+              <a:tabLst/>
+              <a:defRPr/>
+            </a:pPr>
+            <a:r>
+              <a:rPr kumimoji="0" lang="de-DE" sz="2000" b="0" i="0" u="none" strike="noStrike" kern="1200" cap="none" spc="0" normalizeH="0" baseline="0" noProof="0" dirty="0">
+                <a:ln>
+                  <a:noFill/>
+                </a:ln>
+                <a:solidFill>
+                  <a:prstClr val="white"/>
+                </a:solidFill>
+                <a:effectLst/>
+                <a:uLnTx/>
+                <a:uFillTx/>
+                <a:latin typeface="Trebuchet MS" panose="020B0603020202020204" pitchFamily="34" charset="0"/>
+                <a:ea typeface="+mn-ea"/>
+                <a:cs typeface="+mn-cs"/>
+              </a:rPr>
+              <a:t>Erweiterungsmöglichkeiten</a:t>
+            </a:r>
+            <a:endParaRPr kumimoji="0" lang="de-DE" sz="1800" b="0" i="0" u="none" strike="noStrike" kern="1200" cap="none" spc="0" normalizeH="0" baseline="0" noProof="0" dirty="0">
+              <a:ln>
+                <a:noFill/>
+              </a:ln>
+              <a:solidFill>
+                <a:prstClr val="white"/>
+              </a:solidFill>
+              <a:effectLst/>
+              <a:uLnTx/>
+              <a:uFillTx/>
+              <a:latin typeface="Trebuchet MS" panose="020B0603020202020204" pitchFamily="34" charset="0"/>
+              <a:ea typeface="+mn-ea"/>
+              <a:cs typeface="+mn-cs"/>
+            </a:endParaRPr>
           </a:p>
         </p:txBody>
       </p:sp>
@@ -3523,6 +3871,14 @@
 <file path=ppt/slides/slide2.xml><?xml version="1.0" encoding="utf-8"?>
 <p:sld xmlns:a="http://schemas.openxmlformats.org/drawingml/2006/main" xmlns:r="http://schemas.openxmlformats.org/officeDocument/2006/relationships" xmlns:p="http://schemas.openxmlformats.org/presentationml/2006/main">
   <p:cSld>
+    <p:bg>
+      <p:bgPr>
+        <a:solidFill>
+          <a:schemeClr val="bg1"/>
+        </a:solidFill>
+        <a:effectLst/>
+      </p:bgPr>
+    </p:bg>
     <p:spTree>
       <p:nvGrpSpPr>
         <p:cNvPr id="1" name=""/>
@@ -3559,12 +3915,17 @@
         </p:blipFill>
         <p:spPr>
           <a:xfrm>
-            <a:off x="5224826" y="1005417"/>
+            <a:off x="5276584" y="1264209"/>
             <a:ext cx="6473312" cy="4847166"/>
           </a:xfrm>
           <a:prstGeom prst="rect">
             <a:avLst/>
           </a:prstGeom>
+          <a:ln w="19050">
+            <a:solidFill>
+              <a:srgbClr val="009E6F"/>
+            </a:solidFill>
+          </a:ln>
         </p:spPr>
       </p:pic>
       <p:sp>
@@ -3585,7 +3946,7 @@
         </p:nvSpPr>
         <p:spPr>
           <a:xfrm>
-            <a:off x="769189" y="1005417"/>
+            <a:off x="838201" y="1314624"/>
             <a:ext cx="4295955" cy="2535901"/>
           </a:xfrm>
         </p:spPr>
@@ -3596,61 +3957,92 @@
           <a:lstStyle/>
           <a:p>
             <a:r>
-              <a:rPr lang="de-DE" sz="2400" dirty="0"/>
-              <a:t>Voreinstellungen:</a:t>
+              <a:rPr lang="de-DE" sz="2000" dirty="0">
+                <a:solidFill>
+                  <a:srgbClr val="FF0000"/>
+                </a:solidFill>
+                <a:latin typeface="Trebuchet MS" panose="020B0603020202020204" pitchFamily="34" charset="0"/>
+              </a:rPr>
+              <a:t>Voreinstellungen</a:t>
+            </a:r>
+            <a:r>
+              <a:rPr lang="de-DE" sz="2000" dirty="0">
+                <a:latin typeface="Trebuchet MS" panose="020B0603020202020204" pitchFamily="34" charset="0"/>
+              </a:rPr>
+              <a:t>:</a:t>
             </a:r>
           </a:p>
           <a:p>
             <a:pPr lvl="1"/>
             <a:r>
-              <a:rPr lang="de-DE" sz="2000" dirty="0"/>
+              <a:rPr lang="de-DE" sz="1800" dirty="0">
+                <a:latin typeface="Trebuchet MS" panose="020B0603020202020204" pitchFamily="34" charset="0"/>
+              </a:rPr>
               <a:t>Partikelanzahl</a:t>
             </a:r>
           </a:p>
           <a:p>
             <a:pPr lvl="1"/>
             <a:r>
-              <a:rPr lang="de-DE" sz="2000" dirty="0"/>
+              <a:rPr lang="de-DE" sz="1800" dirty="0">
+                <a:latin typeface="Trebuchet MS" panose="020B0603020202020204" pitchFamily="34" charset="0"/>
+              </a:rPr>
               <a:t>Zu Beginn infiziert</a:t>
             </a:r>
           </a:p>
           <a:p>
             <a:pPr lvl="1"/>
             <a:r>
-              <a:rPr lang="de-DE" sz="2000" dirty="0"/>
+              <a:rPr lang="de-DE" sz="1800" dirty="0">
+                <a:latin typeface="Trebuchet MS" panose="020B0603020202020204" pitchFamily="34" charset="0"/>
+              </a:rPr>
               <a:t>Modifizierungen:</a:t>
             </a:r>
           </a:p>
           <a:p>
             <a:pPr lvl="2"/>
             <a:r>
-              <a:rPr lang="de-DE" sz="1800" dirty="0"/>
+              <a:rPr lang="de-DE" sz="1600" dirty="0">
+                <a:latin typeface="Trebuchet MS" panose="020B0603020202020204" pitchFamily="34" charset="0"/>
+              </a:rPr>
               <a:t>Social </a:t>
             </a:r>
             <a:r>
-              <a:rPr lang="de-DE" sz="1800" dirty="0" err="1"/>
+              <a:rPr lang="de-DE" sz="1600" dirty="0" err="1">
+                <a:latin typeface="Trebuchet MS" panose="020B0603020202020204" pitchFamily="34" charset="0"/>
+              </a:rPr>
               <a:t>Distancing</a:t>
             </a:r>
-            <a:endParaRPr lang="de-DE" sz="1800" dirty="0"/>
+            <a:endParaRPr lang="de-DE" sz="1600" dirty="0">
+              <a:latin typeface="Trebuchet MS" panose="020B0603020202020204" pitchFamily="34" charset="0"/>
+            </a:endParaRPr>
           </a:p>
           <a:p>
             <a:pPr lvl="2"/>
             <a:r>
-              <a:rPr lang="de-DE" sz="1800" dirty="0"/>
+              <a:rPr lang="de-DE" sz="1600" dirty="0">
+                <a:latin typeface="Trebuchet MS" panose="020B0603020202020204" pitchFamily="34" charset="0"/>
+              </a:rPr>
               <a:t>Vaccine</a:t>
             </a:r>
           </a:p>
           <a:p>
             <a:pPr lvl="2"/>
             <a:r>
-              <a:rPr lang="de-DE" sz="1800" dirty="0"/>
+              <a:rPr lang="de-DE" sz="1600" dirty="0">
+                <a:latin typeface="Trebuchet MS" panose="020B0603020202020204" pitchFamily="34" charset="0"/>
+              </a:rPr>
               <a:t>Health care </a:t>
             </a:r>
             <a:r>
-              <a:rPr lang="de-DE" sz="1800" dirty="0" err="1"/>
+              <a:rPr lang="de-DE" sz="1600" dirty="0" err="1">
+                <a:latin typeface="Trebuchet MS" panose="020B0603020202020204" pitchFamily="34" charset="0"/>
+              </a:rPr>
               <a:t>system</a:t>
             </a:r>
-            <a:endParaRPr lang="de-DE" sz="1800" dirty="0"/>
+            <a:endParaRPr lang="de-DE" sz="1600" dirty="0">
+              <a:latin typeface="Trebuchet MS" panose="020B0603020202020204" pitchFamily="34" charset="0"/>
+            </a:endParaRPr>
           </a:p>
         </p:txBody>
       </p:sp>
@@ -3670,8 +4062,8 @@
         </p:nvCxnSpPr>
         <p:spPr>
           <a:xfrm>
-            <a:off x="3329797" y="1232994"/>
-            <a:ext cx="2146539" cy="489732"/>
+            <a:off x="3212356" y="1511423"/>
+            <a:ext cx="2315738" cy="470095"/>
           </a:xfrm>
           <a:prstGeom prst="straightConnector1">
             <a:avLst/>
@@ -3712,8 +4104,8 @@
         </p:nvSpPr>
         <p:spPr>
           <a:xfrm>
-            <a:off x="769189" y="3459545"/>
-            <a:ext cx="4782819" cy="2616101"/>
+            <a:off x="820947" y="3837146"/>
+            <a:ext cx="4782819" cy="2339102"/>
           </a:xfrm>
           <a:prstGeom prst="rect">
             <a:avLst/>
@@ -3731,8 +4123,25 @@
               <a:buChar char="•"/>
             </a:pPr>
             <a:r>
-              <a:rPr lang="de-DE" sz="2400" dirty="0"/>
-              <a:t>Zur Simulationszeit änderbar:</a:t>
+              <a:rPr lang="de-DE" sz="2000" dirty="0">
+                <a:latin typeface="Trebuchet MS" panose="020B0603020202020204" pitchFamily="34" charset="0"/>
+              </a:rPr>
+              <a:t>Zur </a:t>
+            </a:r>
+            <a:r>
+              <a:rPr lang="de-DE" sz="2000" dirty="0">
+                <a:solidFill>
+                  <a:srgbClr val="00B050"/>
+                </a:solidFill>
+                <a:latin typeface="Trebuchet MS" panose="020B0603020202020204" pitchFamily="34" charset="0"/>
+              </a:rPr>
+              <a:t>Simulationszeit</a:t>
+            </a:r>
+            <a:r>
+              <a:rPr lang="de-DE" sz="2000" dirty="0">
+                <a:latin typeface="Trebuchet MS" panose="020B0603020202020204" pitchFamily="34" charset="0"/>
+              </a:rPr>
+              <a:t> änderbar:</a:t>
             </a:r>
           </a:p>
           <a:p>
@@ -3741,7 +4150,9 @@
               <a:buChar char="•"/>
             </a:pPr>
             <a:r>
-              <a:rPr lang="de-DE" sz="2000" dirty="0"/>
+              <a:rPr lang="de-DE" dirty="0">
+                <a:latin typeface="Trebuchet MS" panose="020B0603020202020204" pitchFamily="34" charset="0"/>
+              </a:rPr>
               <a:t>Infektionsrisiko</a:t>
             </a:r>
           </a:p>
@@ -3751,7 +4162,9 @@
               <a:buChar char="•"/>
             </a:pPr>
             <a:r>
-              <a:rPr lang="de-DE" sz="2000" dirty="0"/>
+              <a:rPr lang="de-DE" dirty="0">
+                <a:latin typeface="Trebuchet MS" panose="020B0603020202020204" pitchFamily="34" charset="0"/>
+              </a:rPr>
               <a:t>Sterberate</a:t>
             </a:r>
           </a:p>
@@ -3761,7 +4174,9 @@
               <a:buChar char="•"/>
             </a:pPr>
             <a:r>
-              <a:rPr lang="de-DE" sz="2000" dirty="0"/>
+              <a:rPr lang="de-DE" dirty="0">
+                <a:latin typeface="Trebuchet MS" panose="020B0603020202020204" pitchFamily="34" charset="0"/>
+              </a:rPr>
               <a:t>Quarantänewahrscheinlichkeit</a:t>
             </a:r>
           </a:p>
@@ -3771,11 +4186,15 @@
               <a:buChar char="•"/>
             </a:pPr>
             <a:r>
-              <a:rPr lang="de-DE" sz="2000" dirty="0" err="1"/>
+              <a:rPr lang="de-DE" dirty="0" err="1">
+                <a:latin typeface="Trebuchet MS" panose="020B0603020202020204" pitchFamily="34" charset="0"/>
+              </a:rPr>
               <a:t>Durchschnittl</a:t>
             </a:r>
             <a:r>
-              <a:rPr lang="de-DE" sz="2000" dirty="0"/>
+              <a:rPr lang="de-DE" dirty="0">
+                <a:latin typeface="Trebuchet MS" panose="020B0603020202020204" pitchFamily="34" charset="0"/>
+              </a:rPr>
               <a:t>. Infektionszeit</a:t>
             </a:r>
           </a:p>
@@ -3785,11 +4204,15 @@
               <a:buChar char="•"/>
             </a:pPr>
             <a:r>
-              <a:rPr lang="de-DE" sz="2000" dirty="0" err="1"/>
+              <a:rPr lang="de-DE" dirty="0" err="1">
+                <a:latin typeface="Trebuchet MS" panose="020B0603020202020204" pitchFamily="34" charset="0"/>
+              </a:rPr>
               <a:t>Durchschnittl</a:t>
             </a:r>
             <a:r>
-              <a:rPr lang="de-DE" sz="2000" dirty="0"/>
+              <a:rPr lang="de-DE" dirty="0">
+                <a:latin typeface="Trebuchet MS" panose="020B0603020202020204" pitchFamily="34" charset="0"/>
+              </a:rPr>
               <a:t>. Immunitätszeit</a:t>
             </a:r>
           </a:p>
@@ -3799,7 +4222,9 @@
               <a:buChar char="•"/>
             </a:pPr>
             <a:r>
-              <a:rPr lang="de-DE" sz="2000" dirty="0"/>
+              <a:rPr lang="de-DE" dirty="0">
+                <a:latin typeface="Trebuchet MS" panose="020B0603020202020204" pitchFamily="34" charset="0"/>
+              </a:rPr>
               <a:t>Infektionsradius</a:t>
             </a:r>
           </a:p>
@@ -3809,7 +4234,9 @@
               <a:buChar char="•"/>
             </a:pPr>
             <a:r>
-              <a:rPr lang="de-DE" sz="2000" dirty="0"/>
+              <a:rPr lang="de-DE" dirty="0">
+                <a:latin typeface="Trebuchet MS" panose="020B0603020202020204" pitchFamily="34" charset="0"/>
+              </a:rPr>
               <a:t>Simulationsgeschwindigkeit</a:t>
             </a:r>
           </a:p>
@@ -3831,8 +4258,8 @@
         </p:nvCxnSpPr>
         <p:spPr>
           <a:xfrm flipV="1">
-            <a:off x="4845170" y="2064259"/>
-            <a:ext cx="5075208" cy="1643332"/>
+            <a:off x="4684143" y="2323051"/>
+            <a:ext cx="5287993" cy="1704636"/>
           </a:xfrm>
           <a:prstGeom prst="straightConnector1">
             <a:avLst/>
@@ -3875,8 +4302,8 @@
         </p:nvCxnSpPr>
         <p:spPr>
           <a:xfrm>
-            <a:off x="4845170" y="3792305"/>
-            <a:ext cx="1262332" cy="1548758"/>
+            <a:off x="4684143" y="4098227"/>
+            <a:ext cx="1475117" cy="1501628"/>
           </a:xfrm>
           <a:prstGeom prst="straightConnector1">
             <a:avLst/>
@@ -3903,6 +4330,107 @@
           </a:fontRef>
         </p:style>
       </p:cxnSp>
+      <p:sp>
+        <p:nvSpPr>
+          <p:cNvPr id="6" name="Parallelogramm 5">
+            <a:extLst>
+              <a:ext uri="{FF2B5EF4-FFF2-40B4-BE49-F238E27FC236}">
+                <a16:creationId xmlns:a16="http://schemas.microsoft.com/office/drawing/2014/main" id="{104FC815-6B8D-4F04-A55E-CFD9941577A4}"/>
+              </a:ext>
+            </a:extLst>
+          </p:cNvPr>
+          <p:cNvSpPr/>
+          <p:nvPr/>
+        </p:nvSpPr>
+        <p:spPr>
+          <a:xfrm>
+            <a:off x="-330764" y="320406"/>
+            <a:ext cx="3978839" cy="566960"/>
+          </a:xfrm>
+          <a:prstGeom prst="parallelogram">
+            <a:avLst/>
+          </a:prstGeom>
+          <a:solidFill>
+            <a:srgbClr val="009E6F"/>
+          </a:solidFill>
+          <a:ln>
+            <a:solidFill>
+              <a:srgbClr val="009E6F"/>
+            </a:solidFill>
+          </a:ln>
+        </p:spPr>
+        <p:style>
+          <a:lnRef idx="2">
+            <a:schemeClr val="accent6">
+              <a:shade val="50000"/>
+            </a:schemeClr>
+          </a:lnRef>
+          <a:fillRef idx="1">
+            <a:schemeClr val="accent6"/>
+          </a:fillRef>
+          <a:effectRef idx="0">
+            <a:schemeClr val="accent6"/>
+          </a:effectRef>
+          <a:fontRef idx="minor">
+            <a:schemeClr val="lt1"/>
+          </a:fontRef>
+        </p:style>
+        <p:txBody>
+          <a:bodyPr rtlCol="0" anchor="ctr"/>
+          <a:lstStyle/>
+          <a:p>
+            <a:pPr algn="ctr"/>
+            <a:endParaRPr lang="de-DE"/>
+          </a:p>
+        </p:txBody>
+      </p:sp>
+      <p:sp>
+        <p:nvSpPr>
+          <p:cNvPr id="10" name="Textfeld 9">
+            <a:extLst>
+              <a:ext uri="{FF2B5EF4-FFF2-40B4-BE49-F238E27FC236}">
+                <a16:creationId xmlns:a16="http://schemas.microsoft.com/office/drawing/2014/main" id="{2CE29B95-F312-499C-A2C3-2F164CA73677}"/>
+              </a:ext>
+            </a:extLst>
+          </p:cNvPr>
+          <p:cNvSpPr txBox="1"/>
+          <p:nvPr/>
+        </p:nvSpPr>
+        <p:spPr>
+          <a:xfrm>
+            <a:off x="-93722" y="403831"/>
+            <a:ext cx="3504753" cy="400110"/>
+          </a:xfrm>
+          <a:prstGeom prst="rect">
+            <a:avLst/>
+          </a:prstGeom>
+          <a:noFill/>
+        </p:spPr>
+        <p:txBody>
+          <a:bodyPr wrap="square" rtlCol="0">
+            <a:spAutoFit/>
+          </a:bodyPr>
+          <a:lstStyle/>
+          <a:p>
+            <a:pPr algn="ctr"/>
+            <a:r>
+              <a:rPr lang="de-DE" sz="2000" dirty="0">
+                <a:solidFill>
+                  <a:schemeClr val="bg1"/>
+                </a:solidFill>
+                <a:latin typeface="Trebuchet MS" panose="020B0603020202020204" pitchFamily="34" charset="0"/>
+              </a:rPr>
+              <a:t>Einstellungsmöglichkeiten</a:t>
+            </a:r>
+            <a:endParaRPr lang="de-DE" dirty="0">
+              <a:solidFill>
+                <a:schemeClr val="bg1"/>
+              </a:solidFill>
+              <a:latin typeface="Trebuchet MS" panose="020B0603020202020204" pitchFamily="34" charset="0"/>
+            </a:endParaRPr>
+          </a:p>
+        </p:txBody>
+      </p:sp>
     </p:spTree>
     <p:extLst>
       <p:ext uri="{BB962C8B-B14F-4D97-AF65-F5344CB8AC3E}">
@@ -3957,9 +4485,14 @@
         </p:blipFill>
         <p:spPr>
           <a:xfrm>
-            <a:off x="1228829" y="710182"/>
-            <a:ext cx="4953435" cy="3727061"/>
-          </a:xfrm>
+            <a:off x="1393563" y="1045346"/>
+            <a:ext cx="4702437" cy="3538205"/>
+          </a:xfrm>
+          <a:ln w="19050">
+            <a:solidFill>
+              <a:srgbClr val="009E6F"/>
+            </a:solidFill>
+          </a:ln>
         </p:spPr>
       </p:pic>
       <p:pic>
@@ -3984,12 +4517,17 @@
         </p:blipFill>
         <p:spPr>
           <a:xfrm>
-            <a:off x="5520906" y="2727533"/>
-            <a:ext cx="5055920" cy="3781730"/>
+            <a:off x="5434642" y="2947490"/>
+            <a:ext cx="4799729" cy="3590104"/>
           </a:xfrm>
           <a:prstGeom prst="rect">
             <a:avLst/>
           </a:prstGeom>
+          <a:ln w="19050">
+            <a:solidFill>
+              <a:srgbClr val="009E6F"/>
+            </a:solidFill>
+          </a:ln>
         </p:spPr>
       </p:pic>
       <p:cxnSp>
@@ -4008,8 +4546,8 @@
         </p:nvCxnSpPr>
         <p:spPr>
           <a:xfrm>
-            <a:off x="4433977" y="4256612"/>
-            <a:ext cx="1086929" cy="723571"/>
+            <a:off x="4405975" y="4439584"/>
+            <a:ext cx="1028667" cy="686907"/>
           </a:xfrm>
           <a:prstGeom prst="curvedConnector3">
             <a:avLst>
@@ -4052,8 +4590,8 @@
         </p:nvSpPr>
         <p:spPr>
           <a:xfrm>
-            <a:off x="6945105" y="1257193"/>
-            <a:ext cx="3889672" cy="923330"/>
+            <a:off x="6665830" y="1396254"/>
+            <a:ext cx="3681175" cy="1200329"/>
           </a:xfrm>
           <a:prstGeom prst="rect">
             <a:avLst/>
@@ -4067,8 +4605,10 @@
           <a:lstStyle/>
           <a:p>
             <a:r>
-              <a:rPr lang="de-DE" dirty="0"/>
-              <a:t>Im initialen Zustand: </a:t>
+              <a:rPr lang="de-DE" dirty="0">
+                <a:latin typeface="Trebuchet MS" panose="020B0603020202020204" pitchFamily="34" charset="0"/>
+              </a:rPr>
+              <a:t>Im „passiven“ Zustand: </a:t>
             </a:r>
           </a:p>
           <a:p>
@@ -4077,15 +4617,21 @@
               <a:buChar char="•"/>
             </a:pPr>
             <a:r>
-              <a:rPr lang="de-DE" dirty="0"/>
+              <a:rPr lang="de-DE" dirty="0">
+                <a:latin typeface="Trebuchet MS" panose="020B0603020202020204" pitchFamily="34" charset="0"/>
+              </a:rPr>
               <a:t>Parameter auf </a:t>
             </a:r>
             <a:r>
-              <a:rPr lang="de-DE" dirty="0" err="1"/>
+              <a:rPr lang="de-DE" dirty="0" err="1">
+                <a:latin typeface="Trebuchet MS" panose="020B0603020202020204" pitchFamily="34" charset="0"/>
+              </a:rPr>
               <a:t>default</a:t>
             </a:r>
             <a:r>
-              <a:rPr lang="de-DE" dirty="0"/>
+              <a:rPr lang="de-DE" dirty="0">
+                <a:latin typeface="Trebuchet MS" panose="020B0603020202020204" pitchFamily="34" charset="0"/>
+              </a:rPr>
               <a:t> zurücksetzen</a:t>
             </a:r>
           </a:p>
@@ -4095,7 +4641,9 @@
               <a:buChar char="•"/>
             </a:pPr>
             <a:r>
-              <a:rPr lang="de-DE" dirty="0"/>
+              <a:rPr lang="de-DE" dirty="0">
+                <a:latin typeface="Trebuchet MS" panose="020B0603020202020204" pitchFamily="34" charset="0"/>
+              </a:rPr>
               <a:t>Simulation starten</a:t>
             </a:r>
           </a:p>
@@ -4115,8 +4663,8 @@
         </p:nvSpPr>
         <p:spPr>
           <a:xfrm>
-            <a:off x="1026543" y="4734589"/>
-            <a:ext cx="4494363" cy="1477328"/>
+            <a:off x="1085939" y="4742542"/>
+            <a:ext cx="4253453" cy="1754326"/>
           </a:xfrm>
           <a:prstGeom prst="rect">
             <a:avLst/>
@@ -4130,8 +4678,25 @@
           <a:lstStyle/>
           <a:p>
             <a:r>
-              <a:rPr lang="de-DE" dirty="0"/>
-              <a:t>Nach „Start“: </a:t>
+              <a:rPr lang="de-DE" dirty="0">
+                <a:latin typeface="Trebuchet MS" panose="020B0603020202020204" pitchFamily="34" charset="0"/>
+              </a:rPr>
+              <a:t>Nach „</a:t>
+            </a:r>
+            <a:r>
+              <a:rPr lang="de-DE" dirty="0">
+                <a:solidFill>
+                  <a:srgbClr val="FF0000"/>
+                </a:solidFill>
+                <a:latin typeface="Trebuchet MS" panose="020B0603020202020204" pitchFamily="34" charset="0"/>
+              </a:rPr>
+              <a:t>Start</a:t>
+            </a:r>
+            <a:r>
+              <a:rPr lang="de-DE" dirty="0">
+                <a:latin typeface="Trebuchet MS" panose="020B0603020202020204" pitchFamily="34" charset="0"/>
+              </a:rPr>
+              <a:t>“: </a:t>
             </a:r>
           </a:p>
           <a:p>
@@ -4140,20 +4705,10 @@
               <a:buChar char="•"/>
             </a:pPr>
             <a:r>
-              <a:rPr lang="de-DE" dirty="0" err="1"/>
-              <a:t>Reset</a:t>
-            </a:r>
-            <a:r>
-              <a:rPr lang="de-DE" dirty="0"/>
-              <a:t>, Pause/</a:t>
-            </a:r>
-            <a:r>
-              <a:rPr lang="de-DE" dirty="0" err="1"/>
-              <a:t>Resume</a:t>
-            </a:r>
-            <a:r>
-              <a:rPr lang="de-DE" dirty="0"/>
-              <a:t>, Export</a:t>
+              <a:rPr lang="de-DE" dirty="0">
+                <a:latin typeface="Trebuchet MS" panose="020B0603020202020204" pitchFamily="34" charset="0"/>
+              </a:rPr>
+              <a:t>Voreinstellungen werden deaktiviert</a:t>
             </a:r>
           </a:p>
           <a:p>
@@ -4162,8 +4717,34 @@
               <a:buChar char="•"/>
             </a:pPr>
             <a:r>
-              <a:rPr lang="de-DE" dirty="0"/>
-              <a:t>Voreinstellungen werden disabled</a:t>
+              <a:rPr lang="de-DE" dirty="0">
+                <a:latin typeface="Trebuchet MS" panose="020B0603020202020204" pitchFamily="34" charset="0"/>
+              </a:rPr>
+              <a:t>„</a:t>
+            </a:r>
+            <a:r>
+              <a:rPr lang="de-DE" dirty="0" err="1">
+                <a:latin typeface="Trebuchet MS" panose="020B0603020202020204" pitchFamily="34" charset="0"/>
+              </a:rPr>
+              <a:t>Reset</a:t>
+            </a:r>
+            <a:r>
+              <a:rPr lang="de-DE" dirty="0">
+                <a:latin typeface="Trebuchet MS" panose="020B0603020202020204" pitchFamily="34" charset="0"/>
+              </a:rPr>
+              <a:t> </a:t>
+            </a:r>
+            <a:r>
+              <a:rPr lang="de-DE" dirty="0" err="1">
+                <a:latin typeface="Trebuchet MS" panose="020B0603020202020204" pitchFamily="34" charset="0"/>
+              </a:rPr>
+              <a:t>parameters</a:t>
+            </a:r>
+            <a:r>
+              <a:rPr lang="de-DE" dirty="0">
+                <a:latin typeface="Trebuchet MS" panose="020B0603020202020204" pitchFamily="34" charset="0"/>
+              </a:rPr>
+              <a:t>“-Button verschwindet</a:t>
             </a:r>
           </a:p>
           <a:p>
@@ -4172,24 +4753,10 @@
               <a:buChar char="•"/>
             </a:pPr>
             <a:r>
-              <a:rPr lang="de-DE" dirty="0"/>
-              <a:t>„</a:t>
-            </a:r>
-            <a:r>
-              <a:rPr lang="de-DE" dirty="0" err="1"/>
-              <a:t>Reset</a:t>
-            </a:r>
-            <a:r>
-              <a:rPr lang="de-DE" dirty="0"/>
-              <a:t> </a:t>
-            </a:r>
-            <a:r>
-              <a:rPr lang="de-DE" dirty="0" err="1"/>
-              <a:t>parameters</a:t>
-            </a:r>
-            <a:r>
-              <a:rPr lang="de-DE" dirty="0"/>
-              <a:t>“-Button verschwindet</a:t>
+              <a:rPr lang="de-DE" dirty="0">
+                <a:latin typeface="Trebuchet MS" panose="020B0603020202020204" pitchFamily="34" charset="0"/>
+              </a:rPr>
+              <a:t>Simulation läuft</a:t>
             </a:r>
           </a:p>
           <a:p>
@@ -4198,9 +4765,130 @@
               <a:buChar char="•"/>
             </a:pPr>
             <a:r>
-              <a:rPr lang="de-DE" dirty="0"/>
-              <a:t>Simulation läuft</a:t>
-            </a:r>
+              <a:rPr lang="de-DE" dirty="0" err="1">
+                <a:latin typeface="Trebuchet MS" panose="020B0603020202020204" pitchFamily="34" charset="0"/>
+              </a:rPr>
+              <a:t>Reset</a:t>
+            </a:r>
+            <a:r>
+              <a:rPr lang="de-DE" dirty="0">
+                <a:latin typeface="Trebuchet MS" panose="020B0603020202020204" pitchFamily="34" charset="0"/>
+              </a:rPr>
+              <a:t>, Pause/</a:t>
+            </a:r>
+            <a:r>
+              <a:rPr lang="de-DE" dirty="0" err="1">
+                <a:latin typeface="Trebuchet MS" panose="020B0603020202020204" pitchFamily="34" charset="0"/>
+              </a:rPr>
+              <a:t>Resume</a:t>
+            </a:r>
+            <a:r>
+              <a:rPr lang="de-DE" dirty="0">
+                <a:latin typeface="Trebuchet MS" panose="020B0603020202020204" pitchFamily="34" charset="0"/>
+              </a:rPr>
+              <a:t>, Export</a:t>
+            </a:r>
+          </a:p>
+        </p:txBody>
+      </p:sp>
+      <p:sp>
+        <p:nvSpPr>
+          <p:cNvPr id="8" name="Parallelogramm 7">
+            <a:extLst>
+              <a:ext uri="{FF2B5EF4-FFF2-40B4-BE49-F238E27FC236}">
+                <a16:creationId xmlns:a16="http://schemas.microsoft.com/office/drawing/2014/main" id="{B8F497AE-4374-4559-8354-6D174BB8DFE0}"/>
+              </a:ext>
+            </a:extLst>
+          </p:cNvPr>
+          <p:cNvSpPr/>
+          <p:nvPr/>
+        </p:nvSpPr>
+        <p:spPr>
+          <a:xfrm>
+            <a:off x="-330764" y="320406"/>
+            <a:ext cx="3978839" cy="566960"/>
+          </a:xfrm>
+          <a:prstGeom prst="parallelogram">
+            <a:avLst/>
+          </a:prstGeom>
+          <a:solidFill>
+            <a:srgbClr val="009E6F"/>
+          </a:solidFill>
+          <a:ln>
+            <a:solidFill>
+              <a:srgbClr val="009E6F"/>
+            </a:solidFill>
+          </a:ln>
+        </p:spPr>
+        <p:style>
+          <a:lnRef idx="2">
+            <a:schemeClr val="accent6">
+              <a:shade val="50000"/>
+            </a:schemeClr>
+          </a:lnRef>
+          <a:fillRef idx="1">
+            <a:schemeClr val="accent6"/>
+          </a:fillRef>
+          <a:effectRef idx="0">
+            <a:schemeClr val="accent6"/>
+          </a:effectRef>
+          <a:fontRef idx="minor">
+            <a:schemeClr val="lt1"/>
+          </a:fontRef>
+        </p:style>
+        <p:txBody>
+          <a:bodyPr rtlCol="0" anchor="ctr"/>
+          <a:lstStyle/>
+          <a:p>
+            <a:pPr algn="ctr"/>
+            <a:endParaRPr lang="de-DE"/>
+          </a:p>
+        </p:txBody>
+      </p:sp>
+      <p:sp>
+        <p:nvSpPr>
+          <p:cNvPr id="10" name="Textfeld 9">
+            <a:extLst>
+              <a:ext uri="{FF2B5EF4-FFF2-40B4-BE49-F238E27FC236}">
+                <a16:creationId xmlns:a16="http://schemas.microsoft.com/office/drawing/2014/main" id="{636F3E4B-178A-42F5-B129-FBDFFBA27886}"/>
+              </a:ext>
+            </a:extLst>
+          </p:cNvPr>
+          <p:cNvSpPr txBox="1"/>
+          <p:nvPr/>
+        </p:nvSpPr>
+        <p:spPr>
+          <a:xfrm>
+            <a:off x="-93722" y="403831"/>
+            <a:ext cx="3504753" cy="400110"/>
+          </a:xfrm>
+          <a:prstGeom prst="rect">
+            <a:avLst/>
+          </a:prstGeom>
+          <a:noFill/>
+        </p:spPr>
+        <p:txBody>
+          <a:bodyPr wrap="square" rtlCol="0">
+            <a:spAutoFit/>
+          </a:bodyPr>
+          <a:lstStyle/>
+          <a:p>
+            <a:pPr algn="ctr"/>
+            <a:r>
+              <a:rPr lang="de-DE" sz="2000" dirty="0">
+                <a:solidFill>
+                  <a:schemeClr val="bg1"/>
+                </a:solidFill>
+                <a:latin typeface="Trebuchet MS" panose="020B0603020202020204" pitchFamily="34" charset="0"/>
+              </a:rPr>
+              <a:t>Buttons</a:t>
+            </a:r>
+            <a:endParaRPr lang="de-DE" dirty="0">
+              <a:solidFill>
+                <a:schemeClr val="bg1"/>
+              </a:solidFill>
+              <a:latin typeface="Trebuchet MS" panose="020B0603020202020204" pitchFamily="34" charset="0"/>
+            </a:endParaRPr>
           </a:p>
         </p:txBody>
       </p:sp>
@@ -4234,12 +4922,82 @@
           <a:chExt cx="0" cy="0"/>
         </a:xfrm>
       </p:grpSpPr>
-      <p:sp>
-        <p:nvSpPr>
-          <p:cNvPr id="6" name="Ellipse 5">
-            <a:extLst>
-              <a:ext uri="{FF2B5EF4-FFF2-40B4-BE49-F238E27FC236}">
-                <a16:creationId xmlns:a16="http://schemas.microsoft.com/office/drawing/2014/main" id="{D0402778-34E2-447C-A169-B14600BDD7B8}"/>
+      <p:pic>
+        <p:nvPicPr>
+          <p:cNvPr id="10" name="Grafik 9">
+            <a:extLst>
+              <a:ext uri="{FF2B5EF4-FFF2-40B4-BE49-F238E27FC236}">
+                <a16:creationId xmlns:a16="http://schemas.microsoft.com/office/drawing/2014/main" id="{36DF45DA-60C8-489B-B504-BB305B19EEB7}"/>
+              </a:ext>
+            </a:extLst>
+          </p:cNvPr>
+          <p:cNvPicPr>
+            <a:picLocks noChangeAspect="1"/>
+          </p:cNvPicPr>
+          <p:nvPr/>
+        </p:nvPicPr>
+        <p:blipFill>
+          <a:blip r:embed="rId2"/>
+          <a:stretch>
+            <a:fillRect/>
+          </a:stretch>
+        </p:blipFill>
+        <p:spPr>
+          <a:xfrm>
+            <a:off x="1103006" y="1500996"/>
+            <a:ext cx="5148269" cy="3856008"/>
+          </a:xfrm>
+          <a:prstGeom prst="rect">
+            <a:avLst/>
+          </a:prstGeom>
+          <a:ln w="19050">
+            <a:solidFill>
+              <a:srgbClr val="009E6F"/>
+            </a:solidFill>
+          </a:ln>
+        </p:spPr>
+      </p:pic>
+      <p:pic>
+        <p:nvPicPr>
+          <p:cNvPr id="7" name="Grafik 6">
+            <a:extLst>
+              <a:ext uri="{FF2B5EF4-FFF2-40B4-BE49-F238E27FC236}">
+                <a16:creationId xmlns:a16="http://schemas.microsoft.com/office/drawing/2014/main" id="{986D26D3-7445-4E6D-9A08-9191696F2A3C}"/>
+              </a:ext>
+            </a:extLst>
+          </p:cNvPr>
+          <p:cNvPicPr>
+            <a:picLocks noChangeAspect="1"/>
+          </p:cNvPicPr>
+          <p:nvPr/>
+        </p:nvPicPr>
+        <p:blipFill>
+          <a:blip r:embed="rId3"/>
+          <a:stretch>
+            <a:fillRect/>
+          </a:stretch>
+        </p:blipFill>
+        <p:spPr>
+          <a:xfrm>
+            <a:off x="6944215" y="2219325"/>
+            <a:ext cx="3981450" cy="2419350"/>
+          </a:xfrm>
+          <a:prstGeom prst="rect">
+            <a:avLst/>
+          </a:prstGeom>
+          <a:ln w="19050">
+            <a:solidFill>
+              <a:srgbClr val="009E6F"/>
+            </a:solidFill>
+          </a:ln>
+        </p:spPr>
+      </p:pic>
+      <p:sp>
+        <p:nvSpPr>
+          <p:cNvPr id="13" name="Pfeil: nach rechts 12">
+            <a:extLst>
+              <a:ext uri="{FF2B5EF4-FFF2-40B4-BE49-F238E27FC236}">
+                <a16:creationId xmlns:a16="http://schemas.microsoft.com/office/drawing/2014/main" id="{A38D834A-C793-497D-B617-68A9DE361708}"/>
               </a:ext>
             </a:extLst>
           </p:cNvPr>
@@ -4248,16 +5006,16 @@
         </p:nvSpPr>
         <p:spPr>
           <a:xfrm>
-            <a:off x="1172490" y="2668598"/>
-            <a:ext cx="465826" cy="457200"/>
-          </a:xfrm>
-          <a:prstGeom prst="ellipse">
+            <a:off x="6360806" y="3429000"/>
+            <a:ext cx="477328" cy="211347"/>
+          </a:xfrm>
+          <a:prstGeom prst="rightArrow">
             <a:avLst/>
           </a:prstGeom>
           <a:solidFill>
-            <a:srgbClr val="00FF00"/>
+            <a:srgbClr val="EC0606"/>
           </a:solidFill>
-          <a:ln w="19050">
+          <a:ln>
             <a:solidFill>
               <a:schemeClr val="tx1"/>
             </a:solidFill>
@@ -4290,10 +5048,75 @@
       </p:sp>
       <p:sp>
         <p:nvSpPr>
-          <p:cNvPr id="13" name="Ellipse 12">
-            <a:extLst>
-              <a:ext uri="{FF2B5EF4-FFF2-40B4-BE49-F238E27FC236}">
-                <a16:creationId xmlns:a16="http://schemas.microsoft.com/office/drawing/2014/main" id="{363A1ED4-B2FA-493A-B571-B09C48D690A0}"/>
+          <p:cNvPr id="2" name="Textfeld 1">
+            <a:extLst>
+              <a:ext uri="{FF2B5EF4-FFF2-40B4-BE49-F238E27FC236}">
+                <a16:creationId xmlns:a16="http://schemas.microsoft.com/office/drawing/2014/main" id="{97E63B2F-916D-4BB3-A1DA-E28615CE002B}"/>
+              </a:ext>
+            </a:extLst>
+          </p:cNvPr>
+          <p:cNvSpPr txBox="1"/>
+          <p:nvPr/>
+        </p:nvSpPr>
+        <p:spPr>
+          <a:xfrm>
+            <a:off x="6944215" y="5033838"/>
+            <a:ext cx="4462470" cy="646331"/>
+          </a:xfrm>
+          <a:prstGeom prst="rect">
+            <a:avLst/>
+          </a:prstGeom>
+          <a:noFill/>
+        </p:spPr>
+        <p:txBody>
+          <a:bodyPr wrap="square" rtlCol="0">
+            <a:spAutoFit/>
+          </a:bodyPr>
+          <a:lstStyle/>
+          <a:p>
+            <a:pPr marL="285750" indent="-285750">
+              <a:buFont typeface="Arial" panose="020B0604020202020204" pitchFamily="34" charset="0"/>
+              <a:buChar char="•"/>
+            </a:pPr>
+            <a:r>
+              <a:rPr lang="de-DE" dirty="0">
+                <a:latin typeface="Trebuchet MS" panose="020B0603020202020204" pitchFamily="34" charset="0"/>
+              </a:rPr>
+              <a:t>Simulation wird pausiert</a:t>
+            </a:r>
+          </a:p>
+          <a:p>
+            <a:pPr marL="285750" indent="-285750">
+              <a:buFont typeface="Arial" panose="020B0604020202020204" pitchFamily="34" charset="0"/>
+              <a:buChar char="•"/>
+            </a:pPr>
+            <a:r>
+              <a:rPr lang="de-DE" dirty="0">
+                <a:latin typeface="Trebuchet MS" panose="020B0603020202020204" pitchFamily="34" charset="0"/>
+              </a:rPr>
+              <a:t>Nach </a:t>
+            </a:r>
+            <a:r>
+              <a:rPr lang="de-DE" i="1" dirty="0" err="1">
+                <a:latin typeface="Trebuchet MS" panose="020B0603020202020204" pitchFamily="34" charset="0"/>
+              </a:rPr>
+              <a:t>Confirm</a:t>
+            </a:r>
+            <a:r>
+              <a:rPr lang="de-DE" dirty="0">
+                <a:latin typeface="Trebuchet MS" panose="020B0603020202020204" pitchFamily="34" charset="0"/>
+              </a:rPr>
+              <a:t> -&gt; Dateipfad auswählen</a:t>
+            </a:r>
+          </a:p>
+        </p:txBody>
+      </p:sp>
+      <p:sp>
+        <p:nvSpPr>
+          <p:cNvPr id="6" name="Parallelogramm 5">
+            <a:extLst>
+              <a:ext uri="{FF2B5EF4-FFF2-40B4-BE49-F238E27FC236}">
+                <a16:creationId xmlns:a16="http://schemas.microsoft.com/office/drawing/2014/main" id="{87F6BFD0-9A87-4D5E-BD31-8B48D6EC013F}"/>
               </a:ext>
             </a:extLst>
           </p:cNvPr>
@@ -4302,32 +5125,32 @@
         </p:nvSpPr>
         <p:spPr>
           <a:xfrm>
-            <a:off x="1171032" y="3328203"/>
-            <a:ext cx="465826" cy="457200"/>
-          </a:xfrm>
-          <a:prstGeom prst="ellipse">
+            <a:off x="-330764" y="320406"/>
+            <a:ext cx="3978839" cy="566960"/>
+          </a:xfrm>
+          <a:prstGeom prst="parallelogram">
             <a:avLst/>
           </a:prstGeom>
           <a:solidFill>
-            <a:srgbClr val="D80000"/>
+            <a:srgbClr val="009E6F"/>
           </a:solidFill>
-          <a:ln w="19050">
+          <a:ln>
             <a:solidFill>
-              <a:schemeClr val="tx1"/>
+              <a:srgbClr val="009E6F"/>
             </a:solidFill>
           </a:ln>
         </p:spPr>
         <p:style>
           <a:lnRef idx="2">
-            <a:schemeClr val="accent1">
+            <a:schemeClr val="accent6">
               <a:shade val="50000"/>
             </a:schemeClr>
           </a:lnRef>
           <a:fillRef idx="1">
-            <a:schemeClr val="accent1"/>
+            <a:schemeClr val="accent6"/>
           </a:fillRef>
           <a:effectRef idx="0">
-            <a:schemeClr val="accent1"/>
+            <a:schemeClr val="accent6"/>
           </a:effectRef>
           <a:fontRef idx="minor">
             <a:schemeClr val="lt1"/>
@@ -4344,172 +5167,10 @@
       </p:sp>
       <p:sp>
         <p:nvSpPr>
-          <p:cNvPr id="14" name="Ellipse 13">
-            <a:extLst>
-              <a:ext uri="{FF2B5EF4-FFF2-40B4-BE49-F238E27FC236}">
-                <a16:creationId xmlns:a16="http://schemas.microsoft.com/office/drawing/2014/main" id="{53731C3B-6DBB-4BFC-BA01-F685CBDE14FF}"/>
-              </a:ext>
-            </a:extLst>
-          </p:cNvPr>
-          <p:cNvSpPr/>
-          <p:nvPr/>
-        </p:nvSpPr>
-        <p:spPr>
-          <a:xfrm>
-            <a:off x="1171032" y="5307021"/>
-            <a:ext cx="465826" cy="457200"/>
-          </a:xfrm>
-          <a:prstGeom prst="ellipse">
-            <a:avLst/>
-          </a:prstGeom>
-          <a:solidFill>
-            <a:srgbClr val="FFFF00"/>
-          </a:solidFill>
-          <a:ln w="19050">
-            <a:solidFill>
-              <a:schemeClr val="tx1"/>
-            </a:solidFill>
-          </a:ln>
-        </p:spPr>
-        <p:style>
-          <a:lnRef idx="2">
-            <a:schemeClr val="accent1">
-              <a:shade val="50000"/>
-            </a:schemeClr>
-          </a:lnRef>
-          <a:fillRef idx="1">
-            <a:schemeClr val="accent1"/>
-          </a:fillRef>
-          <a:effectRef idx="0">
-            <a:schemeClr val="accent1"/>
-          </a:effectRef>
-          <a:fontRef idx="minor">
-            <a:schemeClr val="lt1"/>
-          </a:fontRef>
-        </p:style>
-        <p:txBody>
-          <a:bodyPr rtlCol="0" anchor="ctr"/>
-          <a:lstStyle/>
-          <a:p>
-            <a:pPr algn="ctr"/>
-            <a:endParaRPr lang="de-DE"/>
-          </a:p>
-        </p:txBody>
-      </p:sp>
-      <p:sp>
-        <p:nvSpPr>
-          <p:cNvPr id="15" name="Ellipse 14">
-            <a:extLst>
-              <a:ext uri="{FF2B5EF4-FFF2-40B4-BE49-F238E27FC236}">
-                <a16:creationId xmlns:a16="http://schemas.microsoft.com/office/drawing/2014/main" id="{49796F80-8DAC-4672-81C4-F4C73E1DC099}"/>
-              </a:ext>
-            </a:extLst>
-          </p:cNvPr>
-          <p:cNvSpPr/>
-          <p:nvPr/>
-        </p:nvSpPr>
-        <p:spPr>
-          <a:xfrm>
-            <a:off x="1171032" y="3987808"/>
-            <a:ext cx="465826" cy="457200"/>
-          </a:xfrm>
-          <a:prstGeom prst="ellipse">
-            <a:avLst/>
-          </a:prstGeom>
-          <a:solidFill>
-            <a:srgbClr val="A3A3A7"/>
-          </a:solidFill>
-          <a:ln w="19050">
-            <a:solidFill>
-              <a:schemeClr val="tx1"/>
-            </a:solidFill>
-          </a:ln>
-        </p:spPr>
-        <p:style>
-          <a:lnRef idx="2">
-            <a:schemeClr val="accent1">
-              <a:shade val="50000"/>
-            </a:schemeClr>
-          </a:lnRef>
-          <a:fillRef idx="1">
-            <a:schemeClr val="accent1"/>
-          </a:fillRef>
-          <a:effectRef idx="0">
-            <a:schemeClr val="accent1"/>
-          </a:effectRef>
-          <a:fontRef idx="minor">
-            <a:schemeClr val="lt1"/>
-          </a:fontRef>
-        </p:style>
-        <p:txBody>
-          <a:bodyPr rtlCol="0" anchor="ctr"/>
-          <a:lstStyle/>
-          <a:p>
-            <a:pPr algn="ctr"/>
-            <a:endParaRPr lang="de-DE"/>
-          </a:p>
-        </p:txBody>
-      </p:sp>
-      <p:sp>
-        <p:nvSpPr>
-          <p:cNvPr id="16" name="Ellipse 15">
-            <a:extLst>
-              <a:ext uri="{FF2B5EF4-FFF2-40B4-BE49-F238E27FC236}">
-                <a16:creationId xmlns:a16="http://schemas.microsoft.com/office/drawing/2014/main" id="{73A60BF3-C21A-444C-8E8C-8F1CA13590A4}"/>
-              </a:ext>
-            </a:extLst>
-          </p:cNvPr>
-          <p:cNvSpPr/>
-          <p:nvPr/>
-        </p:nvSpPr>
-        <p:spPr>
-          <a:xfrm>
-            <a:off x="1171032" y="4647413"/>
-            <a:ext cx="465826" cy="457200"/>
-          </a:xfrm>
-          <a:prstGeom prst="ellipse">
-            <a:avLst/>
-          </a:prstGeom>
-          <a:solidFill>
-            <a:schemeClr val="bg1"/>
-          </a:solidFill>
-          <a:ln w="19050">
-            <a:solidFill>
-              <a:schemeClr val="tx1"/>
-            </a:solidFill>
-          </a:ln>
-        </p:spPr>
-        <p:style>
-          <a:lnRef idx="2">
-            <a:schemeClr val="accent1">
-              <a:shade val="50000"/>
-            </a:schemeClr>
-          </a:lnRef>
-          <a:fillRef idx="1">
-            <a:schemeClr val="accent1"/>
-          </a:fillRef>
-          <a:effectRef idx="0">
-            <a:schemeClr val="accent1"/>
-          </a:effectRef>
-          <a:fontRef idx="minor">
-            <a:schemeClr val="lt1"/>
-          </a:fontRef>
-        </p:style>
-        <p:txBody>
-          <a:bodyPr rtlCol="0" anchor="ctr"/>
-          <a:lstStyle/>
-          <a:p>
-            <a:pPr algn="ctr"/>
-            <a:endParaRPr lang="de-DE"/>
-          </a:p>
-        </p:txBody>
-      </p:sp>
-      <p:sp>
-        <p:nvSpPr>
-          <p:cNvPr id="19" name="Textfeld 18">
-            <a:extLst>
-              <a:ext uri="{FF2B5EF4-FFF2-40B4-BE49-F238E27FC236}">
-                <a16:creationId xmlns:a16="http://schemas.microsoft.com/office/drawing/2014/main" id="{3D137656-CA20-44BF-9EAA-FDD2CEB75112}"/>
+          <p:cNvPr id="11" name="Textfeld 10">
+            <a:extLst>
+              <a:ext uri="{FF2B5EF4-FFF2-40B4-BE49-F238E27FC236}">
+                <a16:creationId xmlns:a16="http://schemas.microsoft.com/office/drawing/2014/main" id="{66404BE0-F76C-404E-ACE8-1273C6A325C5}"/>
               </a:ext>
             </a:extLst>
           </p:cNvPr>
@@ -4518,8 +5179,8 @@
         </p:nvSpPr>
         <p:spPr>
           <a:xfrm>
-            <a:off x="1855625" y="2712532"/>
-            <a:ext cx="1285336" cy="369332"/>
+            <a:off x="-93722" y="403831"/>
+            <a:ext cx="3504753" cy="400110"/>
           </a:xfrm>
           <a:prstGeom prst="rect">
             <a:avLst/>
@@ -4532,364 +5193,29 @@
           </a:bodyPr>
           <a:lstStyle/>
           <a:p>
-            <a:r>
-              <a:rPr lang="de-DE" dirty="0"/>
-              <a:t>Gesund</a:t>
-            </a:r>
-          </a:p>
-        </p:txBody>
-      </p:sp>
-      <p:sp>
-        <p:nvSpPr>
-          <p:cNvPr id="20" name="Textfeld 19">
-            <a:extLst>
-              <a:ext uri="{FF2B5EF4-FFF2-40B4-BE49-F238E27FC236}">
-                <a16:creationId xmlns:a16="http://schemas.microsoft.com/office/drawing/2014/main" id="{5DA78822-8C1B-4FD9-9D08-5FFAD4C619B4}"/>
-              </a:ext>
-            </a:extLst>
-          </p:cNvPr>
-          <p:cNvSpPr txBox="1"/>
-          <p:nvPr/>
-        </p:nvSpPr>
-        <p:spPr>
-          <a:xfrm>
-            <a:off x="1855625" y="3372137"/>
-            <a:ext cx="1285336" cy="369332"/>
-          </a:xfrm>
-          <a:prstGeom prst="rect">
-            <a:avLst/>
-          </a:prstGeom>
-          <a:noFill/>
-        </p:spPr>
-        <p:txBody>
-          <a:bodyPr wrap="square" rtlCol="0">
-            <a:spAutoFit/>
-          </a:bodyPr>
-          <a:lstStyle/>
-          <a:p>
-            <a:r>
-              <a:rPr lang="de-DE" dirty="0"/>
-              <a:t>Infiziert</a:t>
-            </a:r>
-          </a:p>
-        </p:txBody>
-      </p:sp>
-      <p:sp>
-        <p:nvSpPr>
-          <p:cNvPr id="21" name="Textfeld 20">
-            <a:extLst>
-              <a:ext uri="{FF2B5EF4-FFF2-40B4-BE49-F238E27FC236}">
-                <a16:creationId xmlns:a16="http://schemas.microsoft.com/office/drawing/2014/main" id="{23EF4A27-5DDA-4A87-AAB8-95FB5BBF8826}"/>
-              </a:ext>
-            </a:extLst>
-          </p:cNvPr>
-          <p:cNvSpPr txBox="1"/>
-          <p:nvPr/>
-        </p:nvSpPr>
-        <p:spPr>
-          <a:xfrm>
-            <a:off x="1819941" y="4599014"/>
-            <a:ext cx="1974698" cy="553998"/>
-          </a:xfrm>
-          <a:prstGeom prst="rect">
-            <a:avLst/>
-          </a:prstGeom>
-          <a:noFill/>
-        </p:spPr>
-        <p:txBody>
-          <a:bodyPr wrap="square" rtlCol="0">
-            <a:spAutoFit/>
-          </a:bodyPr>
-          <a:lstStyle/>
-          <a:p>
-            <a:r>
-              <a:rPr lang="de-DE" dirty="0"/>
-              <a:t>In Quarantäne</a:t>
-            </a:r>
-          </a:p>
-          <a:p>
-            <a:pPr marL="171450" indent="-171450">
-              <a:buFont typeface="Arial" panose="020B0604020202020204" pitchFamily="34" charset="0"/>
-              <a:buChar char="•"/>
-            </a:pPr>
-            <a:r>
-              <a:rPr lang="de-DE" sz="1100" dirty="0"/>
-              <a:t>Zählen als infiziert</a:t>
-            </a:r>
-            <a:endParaRPr lang="de-DE" sz="1600" dirty="0"/>
-          </a:p>
-        </p:txBody>
-      </p:sp>
-      <p:sp>
-        <p:nvSpPr>
-          <p:cNvPr id="22" name="Textfeld 21">
-            <a:extLst>
-              <a:ext uri="{FF2B5EF4-FFF2-40B4-BE49-F238E27FC236}">
-                <a16:creationId xmlns:a16="http://schemas.microsoft.com/office/drawing/2014/main" id="{EA115C64-284B-4FC1-825D-5C66DE6CA073}"/>
-              </a:ext>
-            </a:extLst>
-          </p:cNvPr>
-          <p:cNvSpPr txBox="1"/>
-          <p:nvPr/>
-        </p:nvSpPr>
-        <p:spPr>
-          <a:xfrm>
-            <a:off x="1819941" y="4019655"/>
-            <a:ext cx="1285336" cy="369332"/>
-          </a:xfrm>
-          <a:prstGeom prst="rect">
-            <a:avLst/>
-          </a:prstGeom>
-          <a:noFill/>
-        </p:spPr>
-        <p:txBody>
-          <a:bodyPr wrap="square" rtlCol="0">
-            <a:spAutoFit/>
-          </a:bodyPr>
-          <a:lstStyle/>
-          <a:p>
-            <a:r>
-              <a:rPr lang="de-DE" dirty="0"/>
-              <a:t>Gestorben</a:t>
-            </a:r>
-          </a:p>
-        </p:txBody>
-      </p:sp>
-      <p:sp>
-        <p:nvSpPr>
-          <p:cNvPr id="23" name="Textfeld 22">
-            <a:extLst>
-              <a:ext uri="{FF2B5EF4-FFF2-40B4-BE49-F238E27FC236}">
-                <a16:creationId xmlns:a16="http://schemas.microsoft.com/office/drawing/2014/main" id="{DA8657B5-80A3-4026-8E69-E4FF02542F9A}"/>
-              </a:ext>
-            </a:extLst>
-          </p:cNvPr>
-          <p:cNvSpPr txBox="1"/>
-          <p:nvPr/>
-        </p:nvSpPr>
-        <p:spPr>
-          <a:xfrm>
-            <a:off x="1819941" y="5231017"/>
-            <a:ext cx="2131151" cy="707886"/>
-          </a:xfrm>
-          <a:prstGeom prst="rect">
-            <a:avLst/>
-          </a:prstGeom>
-          <a:noFill/>
-        </p:spPr>
-        <p:txBody>
-          <a:bodyPr wrap="square" rtlCol="0">
-            <a:spAutoFit/>
-          </a:bodyPr>
-          <a:lstStyle/>
-          <a:p>
-            <a:r>
-              <a:rPr lang="de-DE" dirty="0"/>
-              <a:t>Immun</a:t>
-            </a:r>
-          </a:p>
-          <a:p>
-            <a:pPr marL="285750" indent="-285750">
-              <a:buFont typeface="Arial" panose="020B0604020202020204" pitchFamily="34" charset="0"/>
-              <a:buChar char="•"/>
-            </a:pPr>
-            <a:r>
-              <a:rPr lang="de-DE" sz="1100" dirty="0"/>
-              <a:t>Krankheit überstanden</a:t>
-            </a:r>
-          </a:p>
-          <a:p>
-            <a:pPr marL="285750" indent="-285750">
-              <a:buFont typeface="Arial" panose="020B0604020202020204" pitchFamily="34" charset="0"/>
-              <a:buChar char="•"/>
-            </a:pPr>
-            <a:r>
-              <a:rPr lang="de-DE" sz="1100" dirty="0"/>
-              <a:t>Geimpft</a:t>
-            </a:r>
-          </a:p>
-        </p:txBody>
-      </p:sp>
-      <p:pic>
-        <p:nvPicPr>
-          <p:cNvPr id="25" name="Grafik 24">
-            <a:extLst>
-              <a:ext uri="{FF2B5EF4-FFF2-40B4-BE49-F238E27FC236}">
-                <a16:creationId xmlns:a16="http://schemas.microsoft.com/office/drawing/2014/main" id="{A6B59AE3-5E89-4407-885C-3CDDEDF32209}"/>
-              </a:ext>
-            </a:extLst>
-          </p:cNvPr>
-          <p:cNvPicPr>
-            <a:picLocks noChangeAspect="1"/>
-          </p:cNvPicPr>
-          <p:nvPr/>
-        </p:nvPicPr>
-        <p:blipFill>
-          <a:blip r:embed="rId2"/>
-          <a:stretch>
-            <a:fillRect/>
-          </a:stretch>
-        </p:blipFill>
-        <p:spPr>
-          <a:xfrm>
-            <a:off x="4645181" y="990726"/>
-            <a:ext cx="3289330" cy="3315900"/>
-          </a:xfrm>
-          <a:prstGeom prst="rect">
-            <a:avLst/>
-          </a:prstGeom>
-        </p:spPr>
-      </p:pic>
-      <p:pic>
-        <p:nvPicPr>
-          <p:cNvPr id="27" name="Grafik 26">
-            <a:extLst>
-              <a:ext uri="{FF2B5EF4-FFF2-40B4-BE49-F238E27FC236}">
-                <a16:creationId xmlns:a16="http://schemas.microsoft.com/office/drawing/2014/main" id="{74644437-FE35-4C34-B67B-8ED2A3B661FC}"/>
-              </a:ext>
-            </a:extLst>
-          </p:cNvPr>
-          <p:cNvPicPr>
-            <a:picLocks noChangeAspect="1"/>
-          </p:cNvPicPr>
-          <p:nvPr/>
-        </p:nvPicPr>
-        <p:blipFill>
-          <a:blip r:embed="rId3"/>
-          <a:stretch>
-            <a:fillRect/>
-          </a:stretch>
-        </p:blipFill>
-        <p:spPr>
-          <a:xfrm>
-            <a:off x="7593612" y="2558054"/>
-            <a:ext cx="3289330" cy="3380849"/>
-          </a:xfrm>
-          <a:prstGeom prst="rect">
-            <a:avLst/>
-          </a:prstGeom>
-        </p:spPr>
-      </p:pic>
-      <p:sp>
-        <p:nvSpPr>
-          <p:cNvPr id="28" name="Textfeld 27">
-            <a:extLst>
-              <a:ext uri="{FF2B5EF4-FFF2-40B4-BE49-F238E27FC236}">
-                <a16:creationId xmlns:a16="http://schemas.microsoft.com/office/drawing/2014/main" id="{5BD26293-ABA5-442E-A16D-EC3654EE2BE9}"/>
-              </a:ext>
-            </a:extLst>
-          </p:cNvPr>
-          <p:cNvSpPr txBox="1"/>
-          <p:nvPr/>
-        </p:nvSpPr>
-        <p:spPr>
-          <a:xfrm>
-            <a:off x="5435831" y="4475785"/>
-            <a:ext cx="1708030" cy="646331"/>
-          </a:xfrm>
-          <a:prstGeom prst="rect">
-            <a:avLst/>
-          </a:prstGeom>
-          <a:noFill/>
-        </p:spPr>
-        <p:txBody>
-          <a:bodyPr wrap="square" rtlCol="0">
-            <a:spAutoFit/>
-          </a:bodyPr>
-          <a:lstStyle/>
-          <a:p>
-            <a:r>
-              <a:rPr lang="de-DE" dirty="0"/>
-              <a:t>Angezeigter </a:t>
-            </a:r>
-            <a:r>
-              <a:rPr lang="de-DE" dirty="0">
+            <a:pPr algn="ctr"/>
+            <a:r>
+              <a:rPr lang="de-DE" sz="2000" dirty="0">
                 <a:solidFill>
-                  <a:srgbClr val="FF0000"/>
+                  <a:schemeClr val="bg1"/>
                 </a:solidFill>
-              </a:rPr>
-              <a:t>Infektionsradius</a:t>
-            </a:r>
-          </a:p>
-        </p:txBody>
-      </p:sp>
-      <p:sp>
-        <p:nvSpPr>
-          <p:cNvPr id="29" name="Textfeld 28">
-            <a:extLst>
-              <a:ext uri="{FF2B5EF4-FFF2-40B4-BE49-F238E27FC236}">
-                <a16:creationId xmlns:a16="http://schemas.microsoft.com/office/drawing/2014/main" id="{C74942C9-0EEF-47BD-ACD5-AEBEA0529D7C}"/>
-              </a:ext>
-            </a:extLst>
-          </p:cNvPr>
-          <p:cNvSpPr txBox="1"/>
-          <p:nvPr/>
-        </p:nvSpPr>
-        <p:spPr>
-          <a:xfrm>
-            <a:off x="8384262" y="1687436"/>
-            <a:ext cx="1708030" cy="646331"/>
-          </a:xfrm>
-          <a:prstGeom prst="rect">
-            <a:avLst/>
-          </a:prstGeom>
-          <a:noFill/>
-        </p:spPr>
-        <p:txBody>
-          <a:bodyPr wrap="square" rtlCol="0">
-            <a:spAutoFit/>
-          </a:bodyPr>
-          <a:lstStyle/>
-          <a:p>
-            <a:r>
-              <a:rPr lang="de-DE" dirty="0"/>
-              <a:t>Angezeigter </a:t>
-            </a:r>
-            <a:r>
-              <a:rPr lang="de-DE" dirty="0">
-                <a:solidFill>
-                  <a:srgbClr val="2E2EF2"/>
-                </a:solidFill>
-              </a:rPr>
-              <a:t>Abstandsradius</a:t>
-            </a:r>
-          </a:p>
-        </p:txBody>
-      </p:sp>
-      <p:pic>
-        <p:nvPicPr>
-          <p:cNvPr id="31" name="Grafik 30">
-            <a:extLst>
-              <a:ext uri="{FF2B5EF4-FFF2-40B4-BE49-F238E27FC236}">
-                <a16:creationId xmlns:a16="http://schemas.microsoft.com/office/drawing/2014/main" id="{356832F7-0ABB-4BD7-929C-307E807B9CEE}"/>
-              </a:ext>
-            </a:extLst>
-          </p:cNvPr>
-          <p:cNvPicPr>
-            <a:picLocks noChangeAspect="1"/>
-          </p:cNvPicPr>
-          <p:nvPr/>
-        </p:nvPicPr>
-        <p:blipFill>
-          <a:blip r:embed="rId4"/>
-          <a:stretch>
-            <a:fillRect/>
-          </a:stretch>
-        </p:blipFill>
-        <p:spPr>
-          <a:xfrm>
-            <a:off x="824748" y="665541"/>
-            <a:ext cx="3126344" cy="952558"/>
-          </a:xfrm>
-          <a:prstGeom prst="rect">
-            <a:avLst/>
-          </a:prstGeom>
-        </p:spPr>
-      </p:pic>
+                <a:latin typeface="Trebuchet MS" panose="020B0603020202020204" pitchFamily="34" charset="0"/>
+              </a:rPr>
+              <a:t>Export</a:t>
+            </a:r>
+            <a:endParaRPr lang="de-DE" dirty="0">
+              <a:solidFill>
+                <a:schemeClr val="bg1"/>
+              </a:solidFill>
+              <a:latin typeface="Trebuchet MS" panose="020B0603020202020204" pitchFamily="34" charset="0"/>
+            </a:endParaRPr>
+          </a:p>
+        </p:txBody>
+      </p:sp>
     </p:spTree>
     <p:extLst>
       <p:ext uri="{BB962C8B-B14F-4D97-AF65-F5344CB8AC3E}">
-        <p14:creationId xmlns:p14="http://schemas.microsoft.com/office/powerpoint/2010/main" val="2166238598"/>
+        <p14:creationId xmlns:p14="http://schemas.microsoft.com/office/powerpoint/2010/main" val="2628276693"/>
       </p:ext>
     </p:extLst>
   </p:cSld>
@@ -4916,72 +5242,12 @@
           <a:chExt cx="0" cy="0"/>
         </a:xfrm>
       </p:grpSpPr>
-      <p:pic>
-        <p:nvPicPr>
-          <p:cNvPr id="10" name="Grafik 9">
-            <a:extLst>
-              <a:ext uri="{FF2B5EF4-FFF2-40B4-BE49-F238E27FC236}">
-                <a16:creationId xmlns:a16="http://schemas.microsoft.com/office/drawing/2014/main" id="{36DF45DA-60C8-489B-B504-BB305B19EEB7}"/>
-              </a:ext>
-            </a:extLst>
-          </p:cNvPr>
-          <p:cNvPicPr>
-            <a:picLocks noChangeAspect="1"/>
-          </p:cNvPicPr>
-          <p:nvPr/>
-        </p:nvPicPr>
-        <p:blipFill>
-          <a:blip r:embed="rId2"/>
-          <a:stretch>
-            <a:fillRect/>
-          </a:stretch>
-        </p:blipFill>
-        <p:spPr>
-          <a:xfrm>
-            <a:off x="1103006" y="1500996"/>
-            <a:ext cx="5148269" cy="3856008"/>
-          </a:xfrm>
-          <a:prstGeom prst="rect">
-            <a:avLst/>
-          </a:prstGeom>
-        </p:spPr>
-      </p:pic>
-      <p:pic>
-        <p:nvPicPr>
-          <p:cNvPr id="7" name="Grafik 6">
-            <a:extLst>
-              <a:ext uri="{FF2B5EF4-FFF2-40B4-BE49-F238E27FC236}">
-                <a16:creationId xmlns:a16="http://schemas.microsoft.com/office/drawing/2014/main" id="{986D26D3-7445-4E6D-9A08-9191696F2A3C}"/>
-              </a:ext>
-            </a:extLst>
-          </p:cNvPr>
-          <p:cNvPicPr>
-            <a:picLocks noChangeAspect="1"/>
-          </p:cNvPicPr>
-          <p:nvPr/>
-        </p:nvPicPr>
-        <p:blipFill>
-          <a:blip r:embed="rId3"/>
-          <a:stretch>
-            <a:fillRect/>
-          </a:stretch>
-        </p:blipFill>
-        <p:spPr>
-          <a:xfrm>
-            <a:off x="6944215" y="2219325"/>
-            <a:ext cx="3981450" cy="2419350"/>
-          </a:xfrm>
-          <a:prstGeom prst="rect">
-            <a:avLst/>
-          </a:prstGeom>
-        </p:spPr>
-      </p:pic>
-      <p:sp>
-        <p:nvSpPr>
-          <p:cNvPr id="13" name="Pfeil: nach rechts 12">
-            <a:extLst>
-              <a:ext uri="{FF2B5EF4-FFF2-40B4-BE49-F238E27FC236}">
-                <a16:creationId xmlns:a16="http://schemas.microsoft.com/office/drawing/2014/main" id="{A38D834A-C793-497D-B617-68A9DE361708}"/>
+      <p:sp>
+        <p:nvSpPr>
+          <p:cNvPr id="6" name="Ellipse 5">
+            <a:extLst>
+              <a:ext uri="{FF2B5EF4-FFF2-40B4-BE49-F238E27FC236}">
+                <a16:creationId xmlns:a16="http://schemas.microsoft.com/office/drawing/2014/main" id="{D0402778-34E2-447C-A169-B14600BDD7B8}"/>
               </a:ext>
             </a:extLst>
           </p:cNvPr>
@@ -4990,16 +5256,16 @@
         </p:nvSpPr>
         <p:spPr>
           <a:xfrm>
-            <a:off x="6360806" y="3429000"/>
-            <a:ext cx="477328" cy="211347"/>
-          </a:xfrm>
-          <a:prstGeom prst="rightArrow">
+            <a:off x="1172490" y="2668598"/>
+            <a:ext cx="465826" cy="457200"/>
+          </a:xfrm>
+          <a:prstGeom prst="ellipse">
             <a:avLst/>
           </a:prstGeom>
           <a:solidFill>
-            <a:srgbClr val="EC0606"/>
+            <a:srgbClr val="00FF00"/>
           </a:solidFill>
-          <a:ln>
+          <a:ln w="19050">
             <a:solidFill>
               <a:schemeClr val="tx1"/>
             </a:solidFill>
@@ -5030,10 +5296,753 @@
           </a:p>
         </p:txBody>
       </p:sp>
+      <p:sp>
+        <p:nvSpPr>
+          <p:cNvPr id="13" name="Ellipse 12">
+            <a:extLst>
+              <a:ext uri="{FF2B5EF4-FFF2-40B4-BE49-F238E27FC236}">
+                <a16:creationId xmlns:a16="http://schemas.microsoft.com/office/drawing/2014/main" id="{363A1ED4-B2FA-493A-B571-B09C48D690A0}"/>
+              </a:ext>
+            </a:extLst>
+          </p:cNvPr>
+          <p:cNvSpPr/>
+          <p:nvPr/>
+        </p:nvSpPr>
+        <p:spPr>
+          <a:xfrm>
+            <a:off x="1171032" y="3328203"/>
+            <a:ext cx="465826" cy="457200"/>
+          </a:xfrm>
+          <a:prstGeom prst="ellipse">
+            <a:avLst/>
+          </a:prstGeom>
+          <a:solidFill>
+            <a:srgbClr val="D80000"/>
+          </a:solidFill>
+          <a:ln w="19050">
+            <a:solidFill>
+              <a:schemeClr val="tx1"/>
+            </a:solidFill>
+          </a:ln>
+        </p:spPr>
+        <p:style>
+          <a:lnRef idx="2">
+            <a:schemeClr val="accent1">
+              <a:shade val="50000"/>
+            </a:schemeClr>
+          </a:lnRef>
+          <a:fillRef idx="1">
+            <a:schemeClr val="accent1"/>
+          </a:fillRef>
+          <a:effectRef idx="0">
+            <a:schemeClr val="accent1"/>
+          </a:effectRef>
+          <a:fontRef idx="minor">
+            <a:schemeClr val="lt1"/>
+          </a:fontRef>
+        </p:style>
+        <p:txBody>
+          <a:bodyPr rtlCol="0" anchor="ctr"/>
+          <a:lstStyle/>
+          <a:p>
+            <a:pPr algn="ctr"/>
+            <a:endParaRPr lang="de-DE"/>
+          </a:p>
+        </p:txBody>
+      </p:sp>
+      <p:sp>
+        <p:nvSpPr>
+          <p:cNvPr id="14" name="Ellipse 13">
+            <a:extLst>
+              <a:ext uri="{FF2B5EF4-FFF2-40B4-BE49-F238E27FC236}">
+                <a16:creationId xmlns:a16="http://schemas.microsoft.com/office/drawing/2014/main" id="{53731C3B-6DBB-4BFC-BA01-F685CBDE14FF}"/>
+              </a:ext>
+            </a:extLst>
+          </p:cNvPr>
+          <p:cNvSpPr/>
+          <p:nvPr/>
+        </p:nvSpPr>
+        <p:spPr>
+          <a:xfrm>
+            <a:off x="1171032" y="5307021"/>
+            <a:ext cx="465826" cy="457200"/>
+          </a:xfrm>
+          <a:prstGeom prst="ellipse">
+            <a:avLst/>
+          </a:prstGeom>
+          <a:solidFill>
+            <a:srgbClr val="FFFF00"/>
+          </a:solidFill>
+          <a:ln w="19050">
+            <a:solidFill>
+              <a:schemeClr val="tx1"/>
+            </a:solidFill>
+          </a:ln>
+        </p:spPr>
+        <p:style>
+          <a:lnRef idx="2">
+            <a:schemeClr val="accent1">
+              <a:shade val="50000"/>
+            </a:schemeClr>
+          </a:lnRef>
+          <a:fillRef idx="1">
+            <a:schemeClr val="accent1"/>
+          </a:fillRef>
+          <a:effectRef idx="0">
+            <a:schemeClr val="accent1"/>
+          </a:effectRef>
+          <a:fontRef idx="minor">
+            <a:schemeClr val="lt1"/>
+          </a:fontRef>
+        </p:style>
+        <p:txBody>
+          <a:bodyPr rtlCol="0" anchor="ctr"/>
+          <a:lstStyle/>
+          <a:p>
+            <a:pPr algn="ctr"/>
+            <a:endParaRPr lang="de-DE"/>
+          </a:p>
+        </p:txBody>
+      </p:sp>
+      <p:sp>
+        <p:nvSpPr>
+          <p:cNvPr id="15" name="Ellipse 14">
+            <a:extLst>
+              <a:ext uri="{FF2B5EF4-FFF2-40B4-BE49-F238E27FC236}">
+                <a16:creationId xmlns:a16="http://schemas.microsoft.com/office/drawing/2014/main" id="{49796F80-8DAC-4672-81C4-F4C73E1DC099}"/>
+              </a:ext>
+            </a:extLst>
+          </p:cNvPr>
+          <p:cNvSpPr/>
+          <p:nvPr/>
+        </p:nvSpPr>
+        <p:spPr>
+          <a:xfrm>
+            <a:off x="1171032" y="3987808"/>
+            <a:ext cx="465826" cy="457200"/>
+          </a:xfrm>
+          <a:prstGeom prst="ellipse">
+            <a:avLst/>
+          </a:prstGeom>
+          <a:solidFill>
+            <a:srgbClr val="A3A3A7"/>
+          </a:solidFill>
+          <a:ln w="19050">
+            <a:solidFill>
+              <a:schemeClr val="tx1"/>
+            </a:solidFill>
+          </a:ln>
+        </p:spPr>
+        <p:style>
+          <a:lnRef idx="2">
+            <a:schemeClr val="accent1">
+              <a:shade val="50000"/>
+            </a:schemeClr>
+          </a:lnRef>
+          <a:fillRef idx="1">
+            <a:schemeClr val="accent1"/>
+          </a:fillRef>
+          <a:effectRef idx="0">
+            <a:schemeClr val="accent1"/>
+          </a:effectRef>
+          <a:fontRef idx="minor">
+            <a:schemeClr val="lt1"/>
+          </a:fontRef>
+        </p:style>
+        <p:txBody>
+          <a:bodyPr rtlCol="0" anchor="ctr"/>
+          <a:lstStyle/>
+          <a:p>
+            <a:pPr algn="ctr"/>
+            <a:endParaRPr lang="de-DE"/>
+          </a:p>
+        </p:txBody>
+      </p:sp>
+      <p:sp>
+        <p:nvSpPr>
+          <p:cNvPr id="16" name="Ellipse 15">
+            <a:extLst>
+              <a:ext uri="{FF2B5EF4-FFF2-40B4-BE49-F238E27FC236}">
+                <a16:creationId xmlns:a16="http://schemas.microsoft.com/office/drawing/2014/main" id="{73A60BF3-C21A-444C-8E8C-8F1CA13590A4}"/>
+              </a:ext>
+            </a:extLst>
+          </p:cNvPr>
+          <p:cNvSpPr/>
+          <p:nvPr/>
+        </p:nvSpPr>
+        <p:spPr>
+          <a:xfrm>
+            <a:off x="1171032" y="4647413"/>
+            <a:ext cx="465826" cy="457200"/>
+          </a:xfrm>
+          <a:prstGeom prst="ellipse">
+            <a:avLst/>
+          </a:prstGeom>
+          <a:solidFill>
+            <a:schemeClr val="bg1"/>
+          </a:solidFill>
+          <a:ln w="19050">
+            <a:solidFill>
+              <a:schemeClr val="tx1"/>
+            </a:solidFill>
+          </a:ln>
+        </p:spPr>
+        <p:style>
+          <a:lnRef idx="2">
+            <a:schemeClr val="accent1">
+              <a:shade val="50000"/>
+            </a:schemeClr>
+          </a:lnRef>
+          <a:fillRef idx="1">
+            <a:schemeClr val="accent1"/>
+          </a:fillRef>
+          <a:effectRef idx="0">
+            <a:schemeClr val="accent1"/>
+          </a:effectRef>
+          <a:fontRef idx="minor">
+            <a:schemeClr val="lt1"/>
+          </a:fontRef>
+        </p:style>
+        <p:txBody>
+          <a:bodyPr rtlCol="0" anchor="ctr"/>
+          <a:lstStyle/>
+          <a:p>
+            <a:pPr algn="ctr"/>
+            <a:endParaRPr lang="de-DE"/>
+          </a:p>
+        </p:txBody>
+      </p:sp>
+      <p:sp>
+        <p:nvSpPr>
+          <p:cNvPr id="19" name="Textfeld 18">
+            <a:extLst>
+              <a:ext uri="{FF2B5EF4-FFF2-40B4-BE49-F238E27FC236}">
+                <a16:creationId xmlns:a16="http://schemas.microsoft.com/office/drawing/2014/main" id="{3D137656-CA20-44BF-9EAA-FDD2CEB75112}"/>
+              </a:ext>
+            </a:extLst>
+          </p:cNvPr>
+          <p:cNvSpPr txBox="1"/>
+          <p:nvPr/>
+        </p:nvSpPr>
+        <p:spPr>
+          <a:xfrm>
+            <a:off x="1855625" y="2712532"/>
+            <a:ext cx="1285336" cy="369332"/>
+          </a:xfrm>
+          <a:prstGeom prst="rect">
+            <a:avLst/>
+          </a:prstGeom>
+          <a:noFill/>
+        </p:spPr>
+        <p:txBody>
+          <a:bodyPr wrap="square" rtlCol="0">
+            <a:spAutoFit/>
+          </a:bodyPr>
+          <a:lstStyle/>
+          <a:p>
+            <a:r>
+              <a:rPr lang="de-DE" dirty="0">
+                <a:latin typeface="Trebuchet MS" panose="020B0603020202020204" pitchFamily="34" charset="0"/>
+              </a:rPr>
+              <a:t>Gesund</a:t>
+            </a:r>
+          </a:p>
+        </p:txBody>
+      </p:sp>
+      <p:sp>
+        <p:nvSpPr>
+          <p:cNvPr id="20" name="Textfeld 19">
+            <a:extLst>
+              <a:ext uri="{FF2B5EF4-FFF2-40B4-BE49-F238E27FC236}">
+                <a16:creationId xmlns:a16="http://schemas.microsoft.com/office/drawing/2014/main" id="{5DA78822-8C1B-4FD9-9D08-5FFAD4C619B4}"/>
+              </a:ext>
+            </a:extLst>
+          </p:cNvPr>
+          <p:cNvSpPr txBox="1"/>
+          <p:nvPr/>
+        </p:nvSpPr>
+        <p:spPr>
+          <a:xfrm>
+            <a:off x="1855625" y="3372137"/>
+            <a:ext cx="1285336" cy="369332"/>
+          </a:xfrm>
+          <a:prstGeom prst="rect">
+            <a:avLst/>
+          </a:prstGeom>
+          <a:noFill/>
+        </p:spPr>
+        <p:txBody>
+          <a:bodyPr wrap="square" rtlCol="0">
+            <a:spAutoFit/>
+          </a:bodyPr>
+          <a:lstStyle/>
+          <a:p>
+            <a:r>
+              <a:rPr lang="de-DE" dirty="0">
+                <a:latin typeface="Trebuchet MS" panose="020B0603020202020204" pitchFamily="34" charset="0"/>
+              </a:rPr>
+              <a:t>Infiziert</a:t>
+            </a:r>
+          </a:p>
+        </p:txBody>
+      </p:sp>
+      <p:sp>
+        <p:nvSpPr>
+          <p:cNvPr id="21" name="Textfeld 20">
+            <a:extLst>
+              <a:ext uri="{FF2B5EF4-FFF2-40B4-BE49-F238E27FC236}">
+                <a16:creationId xmlns:a16="http://schemas.microsoft.com/office/drawing/2014/main" id="{23EF4A27-5DDA-4A87-AAB8-95FB5BBF8826}"/>
+              </a:ext>
+            </a:extLst>
+          </p:cNvPr>
+          <p:cNvSpPr txBox="1"/>
+          <p:nvPr/>
+        </p:nvSpPr>
+        <p:spPr>
+          <a:xfrm>
+            <a:off x="1819941" y="4599014"/>
+            <a:ext cx="1974698" cy="553998"/>
+          </a:xfrm>
+          <a:prstGeom prst="rect">
+            <a:avLst/>
+          </a:prstGeom>
+          <a:noFill/>
+        </p:spPr>
+        <p:txBody>
+          <a:bodyPr wrap="square" rtlCol="0">
+            <a:spAutoFit/>
+          </a:bodyPr>
+          <a:lstStyle/>
+          <a:p>
+            <a:r>
+              <a:rPr lang="de-DE" dirty="0">
+                <a:latin typeface="Trebuchet MS" panose="020B0603020202020204" pitchFamily="34" charset="0"/>
+              </a:rPr>
+              <a:t>In Quarantäne</a:t>
+            </a:r>
+          </a:p>
+          <a:p>
+            <a:pPr marL="171450" indent="-171450">
+              <a:buFont typeface="Arial" panose="020B0604020202020204" pitchFamily="34" charset="0"/>
+              <a:buChar char="•"/>
+            </a:pPr>
+            <a:r>
+              <a:rPr lang="de-DE" sz="1100" dirty="0">
+                <a:latin typeface="Trebuchet MS" panose="020B0603020202020204" pitchFamily="34" charset="0"/>
+              </a:rPr>
+              <a:t>Zählen als infiziert</a:t>
+            </a:r>
+            <a:endParaRPr lang="de-DE" sz="1600" dirty="0">
+              <a:latin typeface="Trebuchet MS" panose="020B0603020202020204" pitchFamily="34" charset="0"/>
+            </a:endParaRPr>
+          </a:p>
+        </p:txBody>
+      </p:sp>
+      <p:sp>
+        <p:nvSpPr>
+          <p:cNvPr id="22" name="Textfeld 21">
+            <a:extLst>
+              <a:ext uri="{FF2B5EF4-FFF2-40B4-BE49-F238E27FC236}">
+                <a16:creationId xmlns:a16="http://schemas.microsoft.com/office/drawing/2014/main" id="{EA115C64-284B-4FC1-825D-5C66DE6CA073}"/>
+              </a:ext>
+            </a:extLst>
+          </p:cNvPr>
+          <p:cNvSpPr txBox="1"/>
+          <p:nvPr/>
+        </p:nvSpPr>
+        <p:spPr>
+          <a:xfrm>
+            <a:off x="1819941" y="4019655"/>
+            <a:ext cx="1285336" cy="369332"/>
+          </a:xfrm>
+          <a:prstGeom prst="rect">
+            <a:avLst/>
+          </a:prstGeom>
+          <a:noFill/>
+        </p:spPr>
+        <p:txBody>
+          <a:bodyPr wrap="square" rtlCol="0">
+            <a:spAutoFit/>
+          </a:bodyPr>
+          <a:lstStyle/>
+          <a:p>
+            <a:r>
+              <a:rPr lang="de-DE" dirty="0">
+                <a:latin typeface="Trebuchet MS" panose="020B0603020202020204" pitchFamily="34" charset="0"/>
+              </a:rPr>
+              <a:t>Gestorben</a:t>
+            </a:r>
+          </a:p>
+        </p:txBody>
+      </p:sp>
+      <p:sp>
+        <p:nvSpPr>
+          <p:cNvPr id="23" name="Textfeld 22">
+            <a:extLst>
+              <a:ext uri="{FF2B5EF4-FFF2-40B4-BE49-F238E27FC236}">
+                <a16:creationId xmlns:a16="http://schemas.microsoft.com/office/drawing/2014/main" id="{DA8657B5-80A3-4026-8E69-E4FF02542F9A}"/>
+              </a:ext>
+            </a:extLst>
+          </p:cNvPr>
+          <p:cNvSpPr txBox="1"/>
+          <p:nvPr/>
+        </p:nvSpPr>
+        <p:spPr>
+          <a:xfrm>
+            <a:off x="1819941" y="5231017"/>
+            <a:ext cx="2131151" cy="707886"/>
+          </a:xfrm>
+          <a:prstGeom prst="rect">
+            <a:avLst/>
+          </a:prstGeom>
+          <a:noFill/>
+        </p:spPr>
+        <p:txBody>
+          <a:bodyPr wrap="square" rtlCol="0">
+            <a:spAutoFit/>
+          </a:bodyPr>
+          <a:lstStyle/>
+          <a:p>
+            <a:r>
+              <a:rPr lang="de-DE" dirty="0">
+                <a:latin typeface="Trebuchet MS" panose="020B0603020202020204" pitchFamily="34" charset="0"/>
+              </a:rPr>
+              <a:t>Immun</a:t>
+            </a:r>
+          </a:p>
+          <a:p>
+            <a:pPr marL="285750" indent="-285750">
+              <a:buFont typeface="Arial" panose="020B0604020202020204" pitchFamily="34" charset="0"/>
+              <a:buChar char="•"/>
+            </a:pPr>
+            <a:r>
+              <a:rPr lang="de-DE" sz="1100" dirty="0">
+                <a:latin typeface="Trebuchet MS" panose="020B0603020202020204" pitchFamily="34" charset="0"/>
+              </a:rPr>
+              <a:t>Krankheit überstanden</a:t>
+            </a:r>
+          </a:p>
+          <a:p>
+            <a:pPr marL="285750" indent="-285750">
+              <a:buFont typeface="Arial" panose="020B0604020202020204" pitchFamily="34" charset="0"/>
+              <a:buChar char="•"/>
+            </a:pPr>
+            <a:r>
+              <a:rPr lang="de-DE" sz="1100" dirty="0">
+                <a:solidFill>
+                  <a:schemeClr val="bg2">
+                    <a:lumMod val="75000"/>
+                  </a:schemeClr>
+                </a:solidFill>
+                <a:latin typeface="Trebuchet MS" panose="020B0603020202020204" pitchFamily="34" charset="0"/>
+              </a:rPr>
+              <a:t>Geimpft</a:t>
+            </a:r>
+          </a:p>
+        </p:txBody>
+      </p:sp>
+      <p:pic>
+        <p:nvPicPr>
+          <p:cNvPr id="25" name="Grafik 24">
+            <a:extLst>
+              <a:ext uri="{FF2B5EF4-FFF2-40B4-BE49-F238E27FC236}">
+                <a16:creationId xmlns:a16="http://schemas.microsoft.com/office/drawing/2014/main" id="{A6B59AE3-5E89-4407-885C-3CDDEDF32209}"/>
+              </a:ext>
+            </a:extLst>
+          </p:cNvPr>
+          <p:cNvPicPr>
+            <a:picLocks noChangeAspect="1"/>
+          </p:cNvPicPr>
+          <p:nvPr/>
+        </p:nvPicPr>
+        <p:blipFill>
+          <a:blip r:embed="rId2"/>
+          <a:stretch>
+            <a:fillRect/>
+          </a:stretch>
+        </p:blipFill>
+        <p:spPr>
+          <a:xfrm>
+            <a:off x="4645181" y="990726"/>
+            <a:ext cx="3289330" cy="3315900"/>
+          </a:xfrm>
+          <a:prstGeom prst="rect">
+            <a:avLst/>
+          </a:prstGeom>
+          <a:ln w="19050">
+            <a:solidFill>
+              <a:srgbClr val="009E6F"/>
+            </a:solidFill>
+          </a:ln>
+        </p:spPr>
+      </p:pic>
+      <p:pic>
+        <p:nvPicPr>
+          <p:cNvPr id="27" name="Grafik 26">
+            <a:extLst>
+              <a:ext uri="{FF2B5EF4-FFF2-40B4-BE49-F238E27FC236}">
+                <a16:creationId xmlns:a16="http://schemas.microsoft.com/office/drawing/2014/main" id="{74644437-FE35-4C34-B67B-8ED2A3B661FC}"/>
+              </a:ext>
+            </a:extLst>
+          </p:cNvPr>
+          <p:cNvPicPr>
+            <a:picLocks noChangeAspect="1"/>
+          </p:cNvPicPr>
+          <p:nvPr/>
+        </p:nvPicPr>
+        <p:blipFill>
+          <a:blip r:embed="rId3"/>
+          <a:stretch>
+            <a:fillRect/>
+          </a:stretch>
+        </p:blipFill>
+        <p:spPr>
+          <a:xfrm>
+            <a:off x="7593612" y="2558054"/>
+            <a:ext cx="3289330" cy="3380849"/>
+          </a:xfrm>
+          <a:prstGeom prst="rect">
+            <a:avLst/>
+          </a:prstGeom>
+          <a:ln w="19050">
+            <a:solidFill>
+              <a:srgbClr val="009E6F"/>
+            </a:solidFill>
+          </a:ln>
+        </p:spPr>
+      </p:pic>
+      <p:sp>
+        <p:nvSpPr>
+          <p:cNvPr id="28" name="Textfeld 27">
+            <a:extLst>
+              <a:ext uri="{FF2B5EF4-FFF2-40B4-BE49-F238E27FC236}">
+                <a16:creationId xmlns:a16="http://schemas.microsoft.com/office/drawing/2014/main" id="{5BD26293-ABA5-442E-A16D-EC3654EE2BE9}"/>
+              </a:ext>
+            </a:extLst>
+          </p:cNvPr>
+          <p:cNvSpPr txBox="1"/>
+          <p:nvPr/>
+        </p:nvSpPr>
+        <p:spPr>
+          <a:xfrm>
+            <a:off x="5345399" y="4476433"/>
+            <a:ext cx="1888894" cy="646331"/>
+          </a:xfrm>
+          <a:prstGeom prst="rect">
+            <a:avLst/>
+          </a:prstGeom>
+          <a:noFill/>
+        </p:spPr>
+        <p:txBody>
+          <a:bodyPr wrap="square" rtlCol="0">
+            <a:spAutoFit/>
+          </a:bodyPr>
+          <a:lstStyle/>
+          <a:p>
+            <a:r>
+              <a:rPr lang="de-DE" dirty="0">
+                <a:latin typeface="Trebuchet MS" panose="020B0603020202020204" pitchFamily="34" charset="0"/>
+              </a:rPr>
+              <a:t>Angezeigter </a:t>
+            </a:r>
+            <a:r>
+              <a:rPr lang="de-DE" dirty="0">
+                <a:solidFill>
+                  <a:srgbClr val="FF0000"/>
+                </a:solidFill>
+                <a:latin typeface="Trebuchet MS" panose="020B0603020202020204" pitchFamily="34" charset="0"/>
+              </a:rPr>
+              <a:t>Infektionsradius</a:t>
+            </a:r>
+          </a:p>
+        </p:txBody>
+      </p:sp>
+      <p:sp>
+        <p:nvSpPr>
+          <p:cNvPr id="29" name="Textfeld 28">
+            <a:extLst>
+              <a:ext uri="{FF2B5EF4-FFF2-40B4-BE49-F238E27FC236}">
+                <a16:creationId xmlns:a16="http://schemas.microsoft.com/office/drawing/2014/main" id="{C74942C9-0EEF-47BD-ACD5-AEBEA0529D7C}"/>
+              </a:ext>
+            </a:extLst>
+          </p:cNvPr>
+          <p:cNvSpPr txBox="1"/>
+          <p:nvPr/>
+        </p:nvSpPr>
+        <p:spPr>
+          <a:xfrm>
+            <a:off x="8384261" y="1687436"/>
+            <a:ext cx="1893213" cy="646331"/>
+          </a:xfrm>
+          <a:prstGeom prst="rect">
+            <a:avLst/>
+          </a:prstGeom>
+          <a:noFill/>
+        </p:spPr>
+        <p:txBody>
+          <a:bodyPr wrap="square" rtlCol="0">
+            <a:spAutoFit/>
+          </a:bodyPr>
+          <a:lstStyle/>
+          <a:p>
+            <a:r>
+              <a:rPr lang="de-DE" dirty="0">
+                <a:latin typeface="Trebuchet MS" panose="020B0603020202020204" pitchFamily="34" charset="0"/>
+              </a:rPr>
+              <a:t>Angezeigter </a:t>
+            </a:r>
+            <a:r>
+              <a:rPr lang="de-DE" dirty="0">
+                <a:solidFill>
+                  <a:srgbClr val="2E2EF2"/>
+                </a:solidFill>
+                <a:latin typeface="Trebuchet MS" panose="020B0603020202020204" pitchFamily="34" charset="0"/>
+              </a:rPr>
+              <a:t>Abstandsradius</a:t>
+            </a:r>
+          </a:p>
+        </p:txBody>
+      </p:sp>
+      <p:pic>
+        <p:nvPicPr>
+          <p:cNvPr id="31" name="Grafik 30">
+            <a:extLst>
+              <a:ext uri="{FF2B5EF4-FFF2-40B4-BE49-F238E27FC236}">
+                <a16:creationId xmlns:a16="http://schemas.microsoft.com/office/drawing/2014/main" id="{356832F7-0ABB-4BD7-929C-307E807B9CEE}"/>
+              </a:ext>
+            </a:extLst>
+          </p:cNvPr>
+          <p:cNvPicPr>
+            <a:picLocks noChangeAspect="1"/>
+          </p:cNvPicPr>
+          <p:nvPr/>
+        </p:nvPicPr>
+        <p:blipFill>
+          <a:blip r:embed="rId4"/>
+          <a:stretch>
+            <a:fillRect/>
+          </a:stretch>
+        </p:blipFill>
+        <p:spPr>
+          <a:xfrm>
+            <a:off x="899437" y="1211157"/>
+            <a:ext cx="3126344" cy="952558"/>
+          </a:xfrm>
+          <a:prstGeom prst="rect">
+            <a:avLst/>
+          </a:prstGeom>
+          <a:ln w="19050">
+            <a:solidFill>
+              <a:srgbClr val="009E6F"/>
+            </a:solidFill>
+          </a:ln>
+        </p:spPr>
+      </p:pic>
+      <p:sp>
+        <p:nvSpPr>
+          <p:cNvPr id="17" name="Parallelogramm 16">
+            <a:extLst>
+              <a:ext uri="{FF2B5EF4-FFF2-40B4-BE49-F238E27FC236}">
+                <a16:creationId xmlns:a16="http://schemas.microsoft.com/office/drawing/2014/main" id="{423531D9-421D-4C68-A40C-F05DC2C14A08}"/>
+              </a:ext>
+            </a:extLst>
+          </p:cNvPr>
+          <p:cNvSpPr/>
+          <p:nvPr/>
+        </p:nvSpPr>
+        <p:spPr>
+          <a:xfrm>
+            <a:off x="-330764" y="320406"/>
+            <a:ext cx="3978839" cy="566960"/>
+          </a:xfrm>
+          <a:prstGeom prst="parallelogram">
+            <a:avLst/>
+          </a:prstGeom>
+          <a:solidFill>
+            <a:srgbClr val="009E6F"/>
+          </a:solidFill>
+          <a:ln>
+            <a:solidFill>
+              <a:srgbClr val="009E6F"/>
+            </a:solidFill>
+          </a:ln>
+        </p:spPr>
+        <p:style>
+          <a:lnRef idx="2">
+            <a:schemeClr val="accent6">
+              <a:shade val="50000"/>
+            </a:schemeClr>
+          </a:lnRef>
+          <a:fillRef idx="1">
+            <a:schemeClr val="accent6"/>
+          </a:fillRef>
+          <a:effectRef idx="0">
+            <a:schemeClr val="accent6"/>
+          </a:effectRef>
+          <a:fontRef idx="minor">
+            <a:schemeClr val="lt1"/>
+          </a:fontRef>
+        </p:style>
+        <p:txBody>
+          <a:bodyPr rtlCol="0" anchor="ctr"/>
+          <a:lstStyle/>
+          <a:p>
+            <a:pPr algn="ctr"/>
+            <a:endParaRPr lang="de-DE"/>
+          </a:p>
+        </p:txBody>
+      </p:sp>
+      <p:sp>
+        <p:nvSpPr>
+          <p:cNvPr id="18" name="Textfeld 17">
+            <a:extLst>
+              <a:ext uri="{FF2B5EF4-FFF2-40B4-BE49-F238E27FC236}">
+                <a16:creationId xmlns:a16="http://schemas.microsoft.com/office/drawing/2014/main" id="{222096AE-9E56-4531-9C90-5E613D45A403}"/>
+              </a:ext>
+            </a:extLst>
+          </p:cNvPr>
+          <p:cNvSpPr txBox="1"/>
+          <p:nvPr/>
+        </p:nvSpPr>
+        <p:spPr>
+          <a:xfrm>
+            <a:off x="-93722" y="403831"/>
+            <a:ext cx="3504753" cy="400110"/>
+          </a:xfrm>
+          <a:prstGeom prst="rect">
+            <a:avLst/>
+          </a:prstGeom>
+          <a:noFill/>
+        </p:spPr>
+        <p:txBody>
+          <a:bodyPr wrap="square" rtlCol="0">
+            <a:spAutoFit/>
+          </a:bodyPr>
+          <a:lstStyle/>
+          <a:p>
+            <a:pPr algn="ctr"/>
+            <a:r>
+              <a:rPr lang="de-DE" sz="2000" dirty="0">
+                <a:solidFill>
+                  <a:schemeClr val="bg1"/>
+                </a:solidFill>
+                <a:latin typeface="Trebuchet MS" panose="020B0603020202020204" pitchFamily="34" charset="0"/>
+              </a:rPr>
+              <a:t>Simulation</a:t>
+            </a:r>
+            <a:endParaRPr lang="de-DE" dirty="0">
+              <a:solidFill>
+                <a:schemeClr val="bg1"/>
+              </a:solidFill>
+              <a:latin typeface="Trebuchet MS" panose="020B0603020202020204" pitchFamily="34" charset="0"/>
+            </a:endParaRPr>
+          </a:p>
+        </p:txBody>
+      </p:sp>
     </p:spTree>
     <p:extLst>
       <p:ext uri="{BB962C8B-B14F-4D97-AF65-F5344CB8AC3E}">
-        <p14:creationId xmlns:p14="http://schemas.microsoft.com/office/powerpoint/2010/main" val="2628276693"/>
+        <p14:creationId xmlns:p14="http://schemas.microsoft.com/office/powerpoint/2010/main" val="2166238598"/>
       </p:ext>
     </p:extLst>
   </p:cSld>
@@ -5082,12 +6091,17 @@
         </p:blipFill>
         <p:spPr>
           <a:xfrm>
-            <a:off x="6035614" y="661483"/>
+            <a:off x="3071131" y="1161453"/>
             <a:ext cx="4137623" cy="2620867"/>
           </a:xfrm>
           <a:prstGeom prst="rect">
             <a:avLst/>
           </a:prstGeom>
+          <a:ln w="19050">
+            <a:solidFill>
+              <a:srgbClr val="009E6F"/>
+            </a:solidFill>
+          </a:ln>
         </p:spPr>
       </p:pic>
       <p:pic>
@@ -5112,12 +6126,17 @@
         </p:blipFill>
         <p:spPr>
           <a:xfrm>
-            <a:off x="6035615" y="3575650"/>
+            <a:off x="3065678" y="3970682"/>
             <a:ext cx="4137623" cy="2631506"/>
           </a:xfrm>
           <a:prstGeom prst="rect">
             <a:avLst/>
           </a:prstGeom>
+          <a:ln w="19050">
+            <a:solidFill>
+              <a:srgbClr val="009E6F"/>
+            </a:solidFill>
+          </a:ln>
         </p:spPr>
       </p:pic>
       <p:cxnSp>
@@ -5129,13 +6148,15 @@
               </a:ext>
             </a:extLst>
           </p:cNvPr>
-          <p:cNvCxnSpPr/>
+          <p:cNvCxnSpPr>
+            <a:cxnSpLocks/>
+          </p:cNvCxnSpPr>
           <p:nvPr/>
         </p:nvCxnSpPr>
         <p:spPr>
           <a:xfrm>
-            <a:off x="2656936" y="3424687"/>
-            <a:ext cx="1362974" cy="0"/>
+            <a:off x="-330764" y="3819720"/>
+            <a:ext cx="1289555" cy="0"/>
           </a:xfrm>
           <a:prstGeom prst="line">
             <a:avLst/>
@@ -5175,7 +6196,7 @@
         </p:nvCxnSpPr>
         <p:spPr>
           <a:xfrm flipV="1">
-            <a:off x="4019910" y="2320506"/>
+            <a:off x="958791" y="2715539"/>
             <a:ext cx="1431984" cy="1104181"/>
           </a:xfrm>
           <a:prstGeom prst="straightConnector1">
@@ -5219,7 +6240,7 @@
         </p:nvCxnSpPr>
         <p:spPr>
           <a:xfrm>
-            <a:off x="4019910" y="3424687"/>
+            <a:off x="958791" y="3819720"/>
             <a:ext cx="1431984" cy="1181819"/>
           </a:xfrm>
           <a:prstGeom prst="straightConnector1">
@@ -5261,7 +6282,7 @@
         </p:nvSpPr>
         <p:spPr>
           <a:xfrm rot="19303801">
-            <a:off x="3727894" y="2368712"/>
+            <a:off x="666775" y="2763745"/>
             <a:ext cx="1885765" cy="369332"/>
           </a:xfrm>
           <a:prstGeom prst="rect">
@@ -5276,7 +6297,9 @@
           <a:lstStyle/>
           <a:p>
             <a:r>
-              <a:rPr lang="de-DE" dirty="0"/>
+              <a:rPr lang="de-DE" dirty="0">
+                <a:latin typeface="Trebuchet MS" panose="020B0603020202020204" pitchFamily="34" charset="0"/>
+              </a:rPr>
               <a:t>Keiner infiziert</a:t>
             </a:r>
           </a:p>
@@ -5296,7 +6319,7 @@
         </p:nvSpPr>
         <p:spPr>
           <a:xfrm rot="2379632">
-            <a:off x="3727894" y="4134930"/>
+            <a:off x="666775" y="4529963"/>
             <a:ext cx="1885765" cy="369332"/>
           </a:xfrm>
           <a:prstGeom prst="rect">
@@ -5311,9 +6334,282 @@
           <a:lstStyle/>
           <a:p>
             <a:r>
-              <a:rPr lang="de-DE" dirty="0"/>
+              <a:rPr lang="de-DE" dirty="0">
+                <a:latin typeface="Trebuchet MS" panose="020B0603020202020204" pitchFamily="34" charset="0"/>
+              </a:rPr>
               <a:t>Alle gestorben</a:t>
             </a:r>
+          </a:p>
+        </p:txBody>
+      </p:sp>
+      <p:sp>
+        <p:nvSpPr>
+          <p:cNvPr id="13" name="Textfeld 12">
+            <a:extLst>
+              <a:ext uri="{FF2B5EF4-FFF2-40B4-BE49-F238E27FC236}">
+                <a16:creationId xmlns:a16="http://schemas.microsoft.com/office/drawing/2014/main" id="{5791A810-74D9-46DF-BF49-EB594A31A5D2}"/>
+              </a:ext>
+            </a:extLst>
+          </p:cNvPr>
+          <p:cNvSpPr txBox="1"/>
+          <p:nvPr/>
+        </p:nvSpPr>
+        <p:spPr>
+          <a:xfrm>
+            <a:off x="7815593" y="1923057"/>
+            <a:ext cx="3889672" cy="1754326"/>
+          </a:xfrm>
+          <a:prstGeom prst="rect">
+            <a:avLst/>
+          </a:prstGeom>
+          <a:noFill/>
+        </p:spPr>
+        <p:txBody>
+          <a:bodyPr wrap="square" rtlCol="0">
+            <a:spAutoFit/>
+          </a:bodyPr>
+          <a:lstStyle/>
+          <a:p>
+            <a:r>
+              <a:rPr lang="de-DE" dirty="0">
+                <a:latin typeface="Trebuchet MS" panose="020B0603020202020204" pitchFamily="34" charset="0"/>
+              </a:rPr>
+              <a:t>Pausiert Simulation:</a:t>
+            </a:r>
+          </a:p>
+          <a:p>
+            <a:pPr marL="285750" indent="-285750">
+              <a:buFont typeface="Arial" panose="020B0604020202020204" pitchFamily="34" charset="0"/>
+              <a:buChar char="•"/>
+            </a:pPr>
+            <a:r>
+              <a:rPr lang="de-DE" dirty="0">
+                <a:latin typeface="Trebuchet MS" panose="020B0603020202020204" pitchFamily="34" charset="0"/>
+              </a:rPr>
+              <a:t>Tote insgesamt</a:t>
+            </a:r>
+          </a:p>
+          <a:p>
+            <a:pPr marL="285750" indent="-285750">
+              <a:buFont typeface="Arial" panose="020B0604020202020204" pitchFamily="34" charset="0"/>
+              <a:buChar char="•"/>
+            </a:pPr>
+            <a:r>
+              <a:rPr lang="de-DE" dirty="0">
+                <a:latin typeface="Trebuchet MS" panose="020B0603020202020204" pitchFamily="34" charset="0"/>
+              </a:rPr>
+              <a:t>Maximal zu einem Zeitpunkt infizierte</a:t>
+            </a:r>
+          </a:p>
+          <a:p>
+            <a:pPr marL="285750" indent="-285750">
+              <a:buFont typeface="Arial" panose="020B0604020202020204" pitchFamily="34" charset="0"/>
+              <a:buChar char="•"/>
+            </a:pPr>
+            <a:r>
+              <a:rPr lang="de-DE" dirty="0">
+                <a:latin typeface="Trebuchet MS" panose="020B0603020202020204" pitchFamily="34" charset="0"/>
+              </a:rPr>
+              <a:t>Tage bis „Ende“</a:t>
+            </a:r>
+          </a:p>
+          <a:p>
+            <a:pPr marL="285750" indent="-285750">
+              <a:buFont typeface="Arial" panose="020B0604020202020204" pitchFamily="34" charset="0"/>
+              <a:buChar char="•"/>
+            </a:pPr>
+            <a:r>
+              <a:rPr lang="de-DE" dirty="0">
+                <a:latin typeface="Trebuchet MS" panose="020B0603020202020204" pitchFamily="34" charset="0"/>
+              </a:rPr>
+              <a:t>Gesamtstatistik als Graph</a:t>
+            </a:r>
+          </a:p>
+        </p:txBody>
+      </p:sp>
+      <p:sp>
+        <p:nvSpPr>
+          <p:cNvPr id="8" name="Textfeld 7">
+            <a:extLst>
+              <a:ext uri="{FF2B5EF4-FFF2-40B4-BE49-F238E27FC236}">
+                <a16:creationId xmlns:a16="http://schemas.microsoft.com/office/drawing/2014/main" id="{DB6F4E6D-C392-4E96-8F0F-FCBD80C62E89}"/>
+              </a:ext>
+            </a:extLst>
+          </p:cNvPr>
+          <p:cNvSpPr txBox="1"/>
+          <p:nvPr/>
+        </p:nvSpPr>
+        <p:spPr>
+          <a:xfrm>
+            <a:off x="7815593" y="3904401"/>
+            <a:ext cx="3528682" cy="1477328"/>
+          </a:xfrm>
+          <a:prstGeom prst="rect">
+            <a:avLst/>
+          </a:prstGeom>
+          <a:noFill/>
+        </p:spPr>
+        <p:txBody>
+          <a:bodyPr wrap="square" rtlCol="0">
+            <a:spAutoFit/>
+          </a:bodyPr>
+          <a:lstStyle/>
+          <a:p>
+            <a:pPr marL="285750" indent="-285750">
+              <a:buFont typeface="Wingdings" panose="05000000000000000000" pitchFamily="2" charset="2"/>
+              <a:buChar char="à"/>
+            </a:pPr>
+            <a:r>
+              <a:rPr lang="de-DE" dirty="0">
+                <a:latin typeface="Trebuchet MS" panose="020B0603020202020204" pitchFamily="34" charset="0"/>
+                <a:sym typeface="Wingdings" panose="05000000000000000000" pitchFamily="2" charset="2"/>
+              </a:rPr>
+              <a:t>Simulation kann fortgeführt werden:</a:t>
+            </a:r>
+          </a:p>
+          <a:p>
+            <a:pPr marL="285750" indent="-285750">
+              <a:buFont typeface="Arial" panose="020B0604020202020204" pitchFamily="34" charset="0"/>
+              <a:buChar char="•"/>
+            </a:pPr>
+            <a:r>
+              <a:rPr lang="de-DE" dirty="0" err="1">
+                <a:latin typeface="Trebuchet MS" panose="020B0603020202020204" pitchFamily="34" charset="0"/>
+                <a:sym typeface="Wingdings" panose="05000000000000000000" pitchFamily="2" charset="2"/>
+              </a:rPr>
+              <a:t>Resume</a:t>
+            </a:r>
+            <a:endParaRPr lang="de-DE" dirty="0">
+              <a:latin typeface="Trebuchet MS" panose="020B0603020202020204" pitchFamily="34" charset="0"/>
+              <a:sym typeface="Wingdings" panose="05000000000000000000" pitchFamily="2" charset="2"/>
+            </a:endParaRPr>
+          </a:p>
+          <a:p>
+            <a:pPr marL="285750" indent="-285750">
+              <a:buFont typeface="Arial" panose="020B0604020202020204" pitchFamily="34" charset="0"/>
+              <a:buChar char="•"/>
+            </a:pPr>
+            <a:r>
+              <a:rPr lang="de-DE" dirty="0">
+                <a:latin typeface="Trebuchet MS" panose="020B0603020202020204" pitchFamily="34" charset="0"/>
+                <a:sym typeface="Wingdings" panose="05000000000000000000" pitchFamily="2" charset="2"/>
+              </a:rPr>
+              <a:t>Export</a:t>
+            </a:r>
+          </a:p>
+          <a:p>
+            <a:pPr marL="285750" indent="-285750">
+              <a:buFont typeface="Arial" panose="020B0604020202020204" pitchFamily="34" charset="0"/>
+              <a:buChar char="•"/>
+            </a:pPr>
+            <a:r>
+              <a:rPr lang="de-DE" dirty="0">
+                <a:latin typeface="Trebuchet MS" panose="020B0603020202020204" pitchFamily="34" charset="0"/>
+                <a:sym typeface="Wingdings" panose="05000000000000000000" pitchFamily="2" charset="2"/>
+              </a:rPr>
+              <a:t>Restart</a:t>
+            </a:r>
+          </a:p>
+        </p:txBody>
+      </p:sp>
+      <p:sp>
+        <p:nvSpPr>
+          <p:cNvPr id="15" name="Parallelogramm 14">
+            <a:extLst>
+              <a:ext uri="{FF2B5EF4-FFF2-40B4-BE49-F238E27FC236}">
+                <a16:creationId xmlns:a16="http://schemas.microsoft.com/office/drawing/2014/main" id="{E6A4C2CF-CE19-4740-AE15-7FAB081AAF10}"/>
+              </a:ext>
+            </a:extLst>
+          </p:cNvPr>
+          <p:cNvSpPr/>
+          <p:nvPr/>
+        </p:nvSpPr>
+        <p:spPr>
+          <a:xfrm>
+            <a:off x="-330764" y="320406"/>
+            <a:ext cx="3978839" cy="566960"/>
+          </a:xfrm>
+          <a:prstGeom prst="parallelogram">
+            <a:avLst/>
+          </a:prstGeom>
+          <a:solidFill>
+            <a:srgbClr val="009E6F"/>
+          </a:solidFill>
+          <a:ln>
+            <a:solidFill>
+              <a:srgbClr val="009E6F"/>
+            </a:solidFill>
+          </a:ln>
+        </p:spPr>
+        <p:style>
+          <a:lnRef idx="2">
+            <a:schemeClr val="accent6">
+              <a:shade val="50000"/>
+            </a:schemeClr>
+          </a:lnRef>
+          <a:fillRef idx="1">
+            <a:schemeClr val="accent6"/>
+          </a:fillRef>
+          <a:effectRef idx="0">
+            <a:schemeClr val="accent6"/>
+          </a:effectRef>
+          <a:fontRef idx="minor">
+            <a:schemeClr val="lt1"/>
+          </a:fontRef>
+        </p:style>
+        <p:txBody>
+          <a:bodyPr rtlCol="0" anchor="ctr"/>
+          <a:lstStyle/>
+          <a:p>
+            <a:pPr algn="ctr"/>
+            <a:endParaRPr lang="de-DE"/>
+          </a:p>
+        </p:txBody>
+      </p:sp>
+      <p:sp>
+        <p:nvSpPr>
+          <p:cNvPr id="16" name="Textfeld 15">
+            <a:extLst>
+              <a:ext uri="{FF2B5EF4-FFF2-40B4-BE49-F238E27FC236}">
+                <a16:creationId xmlns:a16="http://schemas.microsoft.com/office/drawing/2014/main" id="{F2ED6273-8678-4AC5-935C-77142524D9F9}"/>
+              </a:ext>
+            </a:extLst>
+          </p:cNvPr>
+          <p:cNvSpPr txBox="1"/>
+          <p:nvPr/>
+        </p:nvSpPr>
+        <p:spPr>
+          <a:xfrm>
+            <a:off x="-93722" y="403831"/>
+            <a:ext cx="3504753" cy="400110"/>
+          </a:xfrm>
+          <a:prstGeom prst="rect">
+            <a:avLst/>
+          </a:prstGeom>
+          <a:noFill/>
+        </p:spPr>
+        <p:txBody>
+          <a:bodyPr wrap="square" rtlCol="0">
+            <a:spAutoFit/>
+          </a:bodyPr>
+          <a:lstStyle/>
+          <a:p>
+            <a:pPr algn="ctr"/>
+            <a:r>
+              <a:rPr lang="de-DE" sz="2000" dirty="0">
+                <a:solidFill>
+                  <a:schemeClr val="bg1"/>
+                </a:solidFill>
+                <a:latin typeface="Trebuchet MS" panose="020B0603020202020204" pitchFamily="34" charset="0"/>
+              </a:rPr>
+              <a:t>Export</a:t>
+            </a:r>
+            <a:endParaRPr lang="de-DE" dirty="0">
+              <a:solidFill>
+                <a:schemeClr val="bg1"/>
+              </a:solidFill>
+              <a:latin typeface="Trebuchet MS" panose="020B0603020202020204" pitchFamily="34" charset="0"/>
+            </a:endParaRPr>
           </a:p>
         </p:txBody>
       </p:sp>
@@ -5349,34 +6645,6 @@
       </p:grpSpPr>
       <p:sp>
         <p:nvSpPr>
-          <p:cNvPr id="2" name="Titel 1">
-            <a:extLst>
-              <a:ext uri="{FF2B5EF4-FFF2-40B4-BE49-F238E27FC236}">
-                <a16:creationId xmlns:a16="http://schemas.microsoft.com/office/drawing/2014/main" id="{E4C3AEBB-145F-47BD-8960-CE6E3E80D7D6}"/>
-              </a:ext>
-            </a:extLst>
-          </p:cNvPr>
-          <p:cNvSpPr>
-            <a:spLocks noGrp="1"/>
-          </p:cNvSpPr>
-          <p:nvPr>
-            <p:ph type="title"/>
-          </p:nvPr>
-        </p:nvSpPr>
-        <p:spPr/>
-        <p:txBody>
-          <a:bodyPr/>
-          <a:lstStyle/>
-          <a:p>
-            <a:r>
-              <a:rPr lang="de-DE" dirty="0"/>
-              <a:t>Technologien</a:t>
-            </a:r>
-          </a:p>
-        </p:txBody>
-      </p:sp>
-      <p:sp>
-        <p:nvSpPr>
           <p:cNvPr id="3" name="Inhaltsplatzhalter 2">
             <a:extLst>
               <a:ext uri="{FF2B5EF4-FFF2-40B4-BE49-F238E27FC236}">
@@ -5391,61 +6659,417 @@
             <p:ph idx="1"/>
           </p:nvPr>
         </p:nvSpPr>
-        <p:spPr/>
-        <p:txBody>
-          <a:bodyPr/>
-          <a:lstStyle/>
-          <a:p>
-            <a:r>
-              <a:rPr lang="de-DE" dirty="0" err="1"/>
-              <a:t>Pyqtgraph</a:t>
-            </a:r>
-            <a:r>
-              <a:rPr lang="de-DE" dirty="0"/>
-              <a:t> </a:t>
-            </a:r>
-            <a:r>
-              <a:rPr lang="de-DE" dirty="0" err="1"/>
-              <a:t>conda</a:t>
-            </a:r>
-            <a:r>
-              <a:rPr lang="de-DE" dirty="0"/>
-              <a:t> </a:t>
-            </a:r>
-            <a:r>
-              <a:rPr lang="de-DE" dirty="0" err="1"/>
-              <a:t>install</a:t>
-            </a:r>
-            <a:r>
-              <a:rPr lang="de-DE" dirty="0"/>
-              <a:t> </a:t>
-            </a:r>
-            <a:r>
-              <a:rPr lang="de-DE" dirty="0" err="1"/>
+        <p:spPr>
+          <a:xfrm>
+            <a:off x="838200" y="1647825"/>
+            <a:ext cx="10515600" cy="4529138"/>
+          </a:xfrm>
+        </p:spPr>
+        <p:txBody>
+          <a:bodyPr>
+            <a:normAutofit fontScale="92500" lnSpcReduction="20000"/>
+          </a:bodyPr>
+          <a:lstStyle/>
+          <a:p>
+            <a:r>
+              <a:rPr lang="de-DE" sz="2600" dirty="0">
+                <a:latin typeface="Trebuchet MS" panose="020B0603020202020204" pitchFamily="34" charset="0"/>
+              </a:rPr>
+              <a:t>Python</a:t>
+            </a:r>
+          </a:p>
+          <a:p>
+            <a:pPr lvl="1"/>
+            <a:r>
+              <a:rPr lang="de-DE" sz="2200" dirty="0">
+                <a:latin typeface="Trebuchet MS" panose="020B0603020202020204" pitchFamily="34" charset="0"/>
+              </a:rPr>
+              <a:t>PyQt5</a:t>
+            </a:r>
+          </a:p>
+          <a:p>
+            <a:pPr lvl="1"/>
+            <a:r>
+              <a:rPr lang="de-DE" sz="2200" dirty="0" err="1">
+                <a:latin typeface="Trebuchet MS" panose="020B0603020202020204" pitchFamily="34" charset="0"/>
+              </a:rPr>
               <a:t>pyqtgraph</a:t>
             </a:r>
-            <a:endParaRPr lang="de-DE" dirty="0"/>
-          </a:p>
-          <a:p>
-            <a:r>
-              <a:rPr lang="de-DE" dirty="0" err="1"/>
+            <a:endParaRPr lang="de-DE" sz="2200" dirty="0">
+              <a:latin typeface="Trebuchet MS" panose="020B0603020202020204" pitchFamily="34" charset="0"/>
+            </a:endParaRPr>
+          </a:p>
+          <a:p>
+            <a:pPr marL="0" indent="0">
+              <a:buNone/>
+            </a:pPr>
+            <a:endParaRPr lang="de-DE" sz="2200" dirty="0">
+              <a:latin typeface="Trebuchet MS" panose="020B0603020202020204" pitchFamily="34" charset="0"/>
+            </a:endParaRPr>
+          </a:p>
+          <a:p>
+            <a:pPr marL="0" indent="0">
+              <a:buNone/>
+            </a:pPr>
+            <a:endParaRPr lang="de-DE" sz="2600" dirty="0">
+              <a:latin typeface="Trebuchet MS" panose="020B0603020202020204" pitchFamily="34" charset="0"/>
+            </a:endParaRPr>
+          </a:p>
+          <a:p>
+            <a:r>
+              <a:rPr lang="de-DE" sz="2600" dirty="0" err="1">
+                <a:latin typeface="Trebuchet MS" panose="020B0603020202020204" pitchFamily="34" charset="0"/>
+              </a:rPr>
               <a:t>NumPy</a:t>
             </a:r>
-            <a:endParaRPr lang="de-DE" dirty="0"/>
-          </a:p>
-          <a:p>
-            <a:r>
-              <a:rPr lang="de-DE" dirty="0" err="1"/>
-              <a:t>random</a:t>
-            </a:r>
-            <a:endParaRPr lang="de-DE" dirty="0"/>
+            <a:endParaRPr lang="de-DE" sz="2600" dirty="0">
+              <a:latin typeface="Trebuchet MS" panose="020B0603020202020204" pitchFamily="34" charset="0"/>
+            </a:endParaRPr>
           </a:p>
           <a:p>
             <a:pPr lvl="1"/>
-            <a:endParaRPr lang="de-DE" dirty="0"/>
-          </a:p>
-        </p:txBody>
-      </p:sp>
+            <a:r>
+              <a:rPr lang="de-DE" sz="2200" dirty="0">
+                <a:latin typeface="Trebuchet MS" panose="020B0603020202020204" pitchFamily="34" charset="0"/>
+              </a:rPr>
+              <a:t>Array – </a:t>
+            </a:r>
+            <a:r>
+              <a:rPr lang="de-DE" sz="2200" dirty="0" err="1">
+                <a:latin typeface="Trebuchet MS" panose="020B0603020202020204" pitchFamily="34" charset="0"/>
+              </a:rPr>
+              <a:t>Slicing</a:t>
+            </a:r>
+            <a:endParaRPr lang="de-DE" sz="2200" dirty="0">
+              <a:latin typeface="Trebuchet MS" panose="020B0603020202020204" pitchFamily="34" charset="0"/>
+            </a:endParaRPr>
+          </a:p>
+          <a:p>
+            <a:pPr lvl="1"/>
+            <a:r>
+              <a:rPr lang="de-DE" sz="2200" dirty="0">
+                <a:latin typeface="Trebuchet MS" panose="020B0603020202020204" pitchFamily="34" charset="0"/>
+              </a:rPr>
+              <a:t>Vorbereitungen für Plot</a:t>
+            </a:r>
+          </a:p>
+          <a:p>
+            <a:endParaRPr lang="de-DE" sz="2600" dirty="0">
+              <a:latin typeface="Trebuchet MS" panose="020B0603020202020204" pitchFamily="34" charset="0"/>
+            </a:endParaRPr>
+          </a:p>
+          <a:p>
+            <a:endParaRPr lang="de-DE" sz="2600" dirty="0">
+              <a:latin typeface="Trebuchet MS" panose="020B0603020202020204" pitchFamily="34" charset="0"/>
+            </a:endParaRPr>
+          </a:p>
+          <a:p>
+            <a:r>
+              <a:rPr lang="de-DE" sz="2600" dirty="0">
+                <a:latin typeface="Trebuchet MS" panose="020B0603020202020204" pitchFamily="34" charset="0"/>
+              </a:rPr>
+              <a:t>Python Standard-Bibliothek:</a:t>
+            </a:r>
+          </a:p>
+          <a:p>
+            <a:pPr lvl="1"/>
+            <a:r>
+              <a:rPr lang="de-DE" sz="2200" dirty="0" err="1">
+                <a:latin typeface="Trebuchet MS" panose="020B0603020202020204" pitchFamily="34" charset="0"/>
+              </a:rPr>
+              <a:t>Csv</a:t>
+            </a:r>
+            <a:endParaRPr lang="de-DE" sz="2200" dirty="0">
+              <a:latin typeface="Trebuchet MS" panose="020B0603020202020204" pitchFamily="34" charset="0"/>
+            </a:endParaRPr>
+          </a:p>
+          <a:p>
+            <a:pPr lvl="1"/>
+            <a:r>
+              <a:rPr lang="de-DE" sz="2200" dirty="0">
+                <a:latin typeface="Trebuchet MS" panose="020B0603020202020204" pitchFamily="34" charset="0"/>
+              </a:rPr>
+              <a:t>Random</a:t>
+            </a:r>
+          </a:p>
+          <a:p>
+            <a:pPr lvl="1"/>
+            <a:endParaRPr lang="de-DE" dirty="0">
+              <a:latin typeface="Trebuchet MS" panose="020B0603020202020204" pitchFamily="34" charset="0"/>
+            </a:endParaRPr>
+          </a:p>
+        </p:txBody>
+      </p:sp>
+      <p:sp>
+        <p:nvSpPr>
+          <p:cNvPr id="9" name="Parallelogramm 8">
+            <a:extLst>
+              <a:ext uri="{FF2B5EF4-FFF2-40B4-BE49-F238E27FC236}">
+                <a16:creationId xmlns:a16="http://schemas.microsoft.com/office/drawing/2014/main" id="{7AAF45F3-E8D5-41E5-A805-EB0802E9DCC3}"/>
+              </a:ext>
+            </a:extLst>
+          </p:cNvPr>
+          <p:cNvSpPr/>
+          <p:nvPr/>
+        </p:nvSpPr>
+        <p:spPr>
+          <a:xfrm>
+            <a:off x="-330764" y="320406"/>
+            <a:ext cx="3978839" cy="566960"/>
+          </a:xfrm>
+          <a:prstGeom prst="parallelogram">
+            <a:avLst/>
+          </a:prstGeom>
+          <a:solidFill>
+            <a:srgbClr val="009E6F"/>
+          </a:solidFill>
+          <a:ln>
+            <a:solidFill>
+              <a:srgbClr val="009E6F"/>
+            </a:solidFill>
+          </a:ln>
+        </p:spPr>
+        <p:style>
+          <a:lnRef idx="2">
+            <a:schemeClr val="accent6">
+              <a:shade val="50000"/>
+            </a:schemeClr>
+          </a:lnRef>
+          <a:fillRef idx="1">
+            <a:schemeClr val="accent6"/>
+          </a:fillRef>
+          <a:effectRef idx="0">
+            <a:schemeClr val="accent6"/>
+          </a:effectRef>
+          <a:fontRef idx="minor">
+            <a:schemeClr val="lt1"/>
+          </a:fontRef>
+        </p:style>
+        <p:txBody>
+          <a:bodyPr rtlCol="0" anchor="ctr"/>
+          <a:lstStyle/>
+          <a:p>
+            <a:pPr marL="0" marR="0" lvl="0" indent="0" algn="ctr" defTabSz="914400" rtl="0" eaLnBrk="1" fontAlgn="auto" latinLnBrk="0" hangingPunct="1">
+              <a:lnSpc>
+                <a:spcPct val="100000"/>
+              </a:lnSpc>
+              <a:spcBef>
+                <a:spcPts val="0"/>
+              </a:spcBef>
+              <a:spcAft>
+                <a:spcPts val="0"/>
+              </a:spcAft>
+              <a:buClrTx/>
+              <a:buSzTx/>
+              <a:buFontTx/>
+              <a:buNone/>
+              <a:tabLst/>
+              <a:defRPr/>
+            </a:pPr>
+            <a:endParaRPr kumimoji="0" lang="de-DE" sz="1800" b="0" i="0" u="none" strike="noStrike" kern="1200" cap="none" spc="0" normalizeH="0" baseline="0" noProof="0">
+              <a:ln>
+                <a:noFill/>
+              </a:ln>
+              <a:solidFill>
+                <a:prstClr val="white"/>
+              </a:solidFill>
+              <a:effectLst/>
+              <a:uLnTx/>
+              <a:uFillTx/>
+              <a:latin typeface="Calibri" panose="020F0502020204030204"/>
+              <a:ea typeface="+mn-ea"/>
+              <a:cs typeface="+mn-cs"/>
+            </a:endParaRPr>
+          </a:p>
+        </p:txBody>
+      </p:sp>
+      <p:sp>
+        <p:nvSpPr>
+          <p:cNvPr id="10" name="Textfeld 9">
+            <a:extLst>
+              <a:ext uri="{FF2B5EF4-FFF2-40B4-BE49-F238E27FC236}">
+                <a16:creationId xmlns:a16="http://schemas.microsoft.com/office/drawing/2014/main" id="{DAB084B1-21F0-44E7-ACA7-916EDEA43422}"/>
+              </a:ext>
+            </a:extLst>
+          </p:cNvPr>
+          <p:cNvSpPr txBox="1"/>
+          <p:nvPr/>
+        </p:nvSpPr>
+        <p:spPr>
+          <a:xfrm>
+            <a:off x="-93722" y="403831"/>
+            <a:ext cx="3504753" cy="400110"/>
+          </a:xfrm>
+          <a:prstGeom prst="rect">
+            <a:avLst/>
+          </a:prstGeom>
+          <a:noFill/>
+        </p:spPr>
+        <p:txBody>
+          <a:bodyPr wrap="square" rtlCol="0">
+            <a:spAutoFit/>
+          </a:bodyPr>
+          <a:lstStyle/>
+          <a:p>
+            <a:pPr marL="0" marR="0" lvl="0" indent="0" algn="ctr" defTabSz="914400" rtl="0" eaLnBrk="1" fontAlgn="auto" latinLnBrk="0" hangingPunct="1">
+              <a:lnSpc>
+                <a:spcPct val="100000"/>
+              </a:lnSpc>
+              <a:spcBef>
+                <a:spcPts val="0"/>
+              </a:spcBef>
+              <a:spcAft>
+                <a:spcPts val="0"/>
+              </a:spcAft>
+              <a:buClrTx/>
+              <a:buSzTx/>
+              <a:buFontTx/>
+              <a:buNone/>
+              <a:tabLst/>
+              <a:defRPr/>
+            </a:pPr>
+            <a:r>
+              <a:rPr kumimoji="0" lang="de-DE" sz="2000" b="0" i="0" u="none" strike="noStrike" kern="1200" cap="none" spc="0" normalizeH="0" baseline="0" noProof="0" dirty="0">
+                <a:ln>
+                  <a:noFill/>
+                </a:ln>
+                <a:solidFill>
+                  <a:prstClr val="white"/>
+                </a:solidFill>
+                <a:effectLst/>
+                <a:uLnTx/>
+                <a:uFillTx/>
+                <a:latin typeface="Trebuchet MS" panose="020B0603020202020204" pitchFamily="34" charset="0"/>
+                <a:ea typeface="+mn-ea"/>
+                <a:cs typeface="+mn-cs"/>
+              </a:rPr>
+              <a:t>Technologien</a:t>
+            </a:r>
+            <a:endParaRPr kumimoji="0" lang="de-DE" sz="1800" b="0" i="0" u="none" strike="noStrike" kern="1200" cap="none" spc="0" normalizeH="0" baseline="0" noProof="0" dirty="0">
+              <a:ln>
+                <a:noFill/>
+              </a:ln>
+              <a:solidFill>
+                <a:prstClr val="white"/>
+              </a:solidFill>
+              <a:effectLst/>
+              <a:uLnTx/>
+              <a:uFillTx/>
+              <a:latin typeface="Trebuchet MS" panose="020B0603020202020204" pitchFamily="34" charset="0"/>
+              <a:ea typeface="+mn-ea"/>
+              <a:cs typeface="+mn-cs"/>
+            </a:endParaRPr>
+          </a:p>
+        </p:txBody>
+      </p:sp>
+      <p:pic>
+        <p:nvPicPr>
+          <p:cNvPr id="14" name="Grafik 13">
+            <a:extLst>
+              <a:ext uri="{FF2B5EF4-FFF2-40B4-BE49-F238E27FC236}">
+                <a16:creationId xmlns:a16="http://schemas.microsoft.com/office/drawing/2014/main" id="{89B4289D-F09A-444A-B9C3-B62FD45970E4}"/>
+              </a:ext>
+            </a:extLst>
+          </p:cNvPr>
+          <p:cNvPicPr>
+            <a:picLocks noChangeAspect="1"/>
+          </p:cNvPicPr>
+          <p:nvPr/>
+        </p:nvPicPr>
+        <p:blipFill>
+          <a:blip r:embed="rId2">
+            <a:extLst>
+              <a:ext uri="{28A0092B-C50C-407E-A947-70E740481C1C}">
+                <a14:useLocalDpi xmlns:a14="http://schemas.microsoft.com/office/drawing/2010/main" val="0"/>
+              </a:ext>
+            </a:extLst>
+          </a:blip>
+          <a:stretch>
+            <a:fillRect/>
+          </a:stretch>
+        </p:blipFill>
+        <p:spPr>
+          <a:xfrm>
+            <a:off x="7426822" y="4063574"/>
+            <a:ext cx="1542338" cy="1542338"/>
+          </a:xfrm>
+          <a:prstGeom prst="rect">
+            <a:avLst/>
+          </a:prstGeom>
+        </p:spPr>
+      </p:pic>
+      <p:pic>
+        <p:nvPicPr>
+          <p:cNvPr id="16" name="Grafik 15">
+            <a:extLst>
+              <a:ext uri="{FF2B5EF4-FFF2-40B4-BE49-F238E27FC236}">
+                <a16:creationId xmlns:a16="http://schemas.microsoft.com/office/drawing/2014/main" id="{94B9467D-98BF-4B6A-9929-564D06DAC78B}"/>
+              </a:ext>
+            </a:extLst>
+          </p:cNvPr>
+          <p:cNvPicPr>
+            <a:picLocks noChangeAspect="1"/>
+          </p:cNvPicPr>
+          <p:nvPr/>
+        </p:nvPicPr>
+        <p:blipFill>
+          <a:blip r:embed="rId3">
+            <a:extLst>
+              <a:ext uri="{28A0092B-C50C-407E-A947-70E740481C1C}">
+                <a14:useLocalDpi xmlns:a14="http://schemas.microsoft.com/office/drawing/2010/main" val="0"/>
+              </a:ext>
+            </a:extLst>
+          </a:blip>
+          <a:stretch>
+            <a:fillRect/>
+          </a:stretch>
+        </p:blipFill>
+        <p:spPr>
+          <a:xfrm>
+            <a:off x="6610056" y="1072917"/>
+            <a:ext cx="3175870" cy="2117246"/>
+          </a:xfrm>
+          <a:prstGeom prst="rect">
+            <a:avLst/>
+          </a:prstGeom>
+        </p:spPr>
+      </p:pic>
+      <p:pic>
+        <p:nvPicPr>
+          <p:cNvPr id="18" name="Grafik 17">
+            <a:extLst>
+              <a:ext uri="{FF2B5EF4-FFF2-40B4-BE49-F238E27FC236}">
+                <a16:creationId xmlns:a16="http://schemas.microsoft.com/office/drawing/2014/main" id="{4D5914F0-DB2C-4D24-BC2F-EC1613764AEA}"/>
+              </a:ext>
+            </a:extLst>
+          </p:cNvPr>
+          <p:cNvPicPr>
+            <a:picLocks noChangeAspect="1"/>
+          </p:cNvPicPr>
+          <p:nvPr/>
+        </p:nvPicPr>
+        <p:blipFill>
+          <a:blip r:embed="rId4">
+            <a:extLst>
+              <a:ext uri="{28A0092B-C50C-407E-A947-70E740481C1C}">
+                <a14:useLocalDpi xmlns:a14="http://schemas.microsoft.com/office/drawing/2010/main" val="0"/>
+              </a:ext>
+            </a:extLst>
+          </a:blip>
+          <a:stretch>
+            <a:fillRect/>
+          </a:stretch>
+        </p:blipFill>
+        <p:spPr>
+          <a:xfrm>
+            <a:off x="9471601" y="2735041"/>
+            <a:ext cx="1177353" cy="1177353"/>
+          </a:xfrm>
+          <a:prstGeom prst="rect">
+            <a:avLst/>
+          </a:prstGeom>
+        </p:spPr>
+      </p:pic>
     </p:spTree>
     <p:extLst>
       <p:ext uri="{BB962C8B-B14F-4D97-AF65-F5344CB8AC3E}">
@@ -5478,34 +7102,6 @@
       </p:grpSpPr>
       <p:sp>
         <p:nvSpPr>
-          <p:cNvPr id="2" name="Titel 1">
-            <a:extLst>
-              <a:ext uri="{FF2B5EF4-FFF2-40B4-BE49-F238E27FC236}">
-                <a16:creationId xmlns:a16="http://schemas.microsoft.com/office/drawing/2014/main" id="{EC1FA277-87C2-457F-A8F2-F5AB333F3AF5}"/>
-              </a:ext>
-            </a:extLst>
-          </p:cNvPr>
-          <p:cNvSpPr>
-            <a:spLocks noGrp="1"/>
-          </p:cNvSpPr>
-          <p:nvPr>
-            <p:ph type="title"/>
-          </p:nvPr>
-        </p:nvSpPr>
-        <p:spPr/>
-        <p:txBody>
-          <a:bodyPr/>
-          <a:lstStyle/>
-          <a:p>
-            <a:r>
-              <a:rPr lang="de-DE" dirty="0"/>
-              <a:t>Schwierigkeiten</a:t>
-            </a:r>
-          </a:p>
-        </p:txBody>
-      </p:sp>
-      <p:sp>
-        <p:nvSpPr>
           <p:cNvPr id="3" name="Inhaltsplatzhalter 2">
             <a:extLst>
               <a:ext uri="{FF2B5EF4-FFF2-40B4-BE49-F238E27FC236}">
@@ -5520,30 +7116,301 @@
             <p:ph idx="1"/>
           </p:nvPr>
         </p:nvSpPr>
-        <p:spPr/>
-        <p:txBody>
-          <a:bodyPr/>
-          <a:lstStyle/>
-          <a:p>
-            <a:r>
-              <a:rPr lang="de-DE" dirty="0"/>
+        <p:spPr>
+          <a:xfrm>
+            <a:off x="838200" y="1647825"/>
+            <a:ext cx="10515600" cy="4529137"/>
+          </a:xfrm>
+        </p:spPr>
+        <p:txBody>
+          <a:bodyPr>
+            <a:normAutofit/>
+          </a:bodyPr>
+          <a:lstStyle/>
+          <a:p>
+            <a:r>
+              <a:rPr lang="de-DE" sz="2400" dirty="0">
+                <a:latin typeface="Trebuchet MS" panose="020B0603020202020204" pitchFamily="34" charset="0"/>
+              </a:rPr>
               <a:t>Erstes selbstständiges Projekt</a:t>
             </a:r>
           </a:p>
           <a:p>
-            <a:r>
-              <a:rPr lang="de-DE" dirty="0"/>
+            <a:pPr lvl="1"/>
+            <a:r>
+              <a:rPr lang="de-DE" sz="2000" dirty="0">
+                <a:latin typeface="Trebuchet MS" panose="020B0603020202020204" pitchFamily="34" charset="0"/>
+              </a:rPr>
+              <a:t>Recherche von Möglichkeiten, Funktionen, usw.</a:t>
+            </a:r>
+          </a:p>
+          <a:p>
+            <a:pPr lvl="1"/>
+            <a:r>
+              <a:rPr lang="de-DE" sz="2000" dirty="0">
+                <a:latin typeface="Trebuchet MS" panose="020B0603020202020204" pitchFamily="34" charset="0"/>
+              </a:rPr>
+              <a:t>Selbstständiges Verstehen von Funktionalitäten</a:t>
+            </a:r>
+          </a:p>
+          <a:p>
+            <a:r>
+              <a:rPr lang="de-DE" sz="2400" dirty="0">
+                <a:latin typeface="Trebuchet MS" panose="020B0603020202020204" pitchFamily="34" charset="0"/>
+              </a:rPr>
               <a:t>MVP verstehen und umsetzen</a:t>
             </a:r>
           </a:p>
           <a:p>
-            <a:r>
-              <a:rPr lang="de-DE" dirty="0"/>
+            <a:pPr lvl="1"/>
+            <a:r>
+              <a:rPr lang="de-DE" sz="2000" dirty="0">
+                <a:latin typeface="Trebuchet MS" panose="020B0603020202020204" pitchFamily="34" charset="0"/>
+              </a:rPr>
+              <a:t>Strukturierung zu Beginn sehr kompliziert</a:t>
+            </a:r>
+          </a:p>
+          <a:p>
+            <a:pPr lvl="2"/>
+            <a:r>
+              <a:rPr lang="de-DE" sz="1600" dirty="0">
+                <a:latin typeface="Trebuchet MS" panose="020B0603020202020204" pitchFamily="34" charset="0"/>
+              </a:rPr>
+              <a:t>Was muss wo hin</a:t>
+            </a:r>
+          </a:p>
+          <a:p>
+            <a:pPr lvl="2"/>
+            <a:r>
+              <a:rPr lang="de-DE" sz="1600" dirty="0">
+                <a:latin typeface="Trebuchet MS" panose="020B0603020202020204" pitchFamily="34" charset="0"/>
+              </a:rPr>
+              <a:t>Was darf wo nicht hin</a:t>
+            </a:r>
+            <a:endParaRPr lang="de-DE" sz="2000" dirty="0">
+              <a:latin typeface="Trebuchet MS" panose="020B0603020202020204" pitchFamily="34" charset="0"/>
+            </a:endParaRPr>
+          </a:p>
+          <a:p>
+            <a:r>
+              <a:rPr lang="de-DE" sz="2400" dirty="0">
+                <a:latin typeface="Trebuchet MS" panose="020B0603020202020204" pitchFamily="34" charset="0"/>
+              </a:rPr>
               <a:t>Bewegung und Kollisionsbehandlung</a:t>
             </a:r>
           </a:p>
           <a:p>
-            <a:endParaRPr lang="de-DE" dirty="0"/>
+            <a:pPr lvl="1"/>
+            <a:r>
+              <a:rPr lang="de-DE" sz="2000" dirty="0">
+                <a:latin typeface="Trebuchet MS" panose="020B0603020202020204" pitchFamily="34" charset="0"/>
+                <a:sym typeface="Wingdings" panose="05000000000000000000" pitchFamily="2" charset="2"/>
+              </a:rPr>
+              <a:t>Erkennen von Kollisionen (x² + y² = r²) </a:t>
+            </a:r>
+          </a:p>
+          <a:p>
+            <a:pPr marL="457200" lvl="1" indent="0">
+              <a:buNone/>
+            </a:pPr>
+            <a:r>
+              <a:rPr lang="de-DE" sz="2000" dirty="0">
+                <a:latin typeface="Trebuchet MS" panose="020B0603020202020204" pitchFamily="34" charset="0"/>
+                <a:sym typeface="Wingdings" panose="05000000000000000000" pitchFamily="2" charset="2"/>
+              </a:rPr>
+              <a:t>	 „Ellipsen“ verschieben ihren Mittelpunkt mit ihrem Radius</a:t>
+            </a:r>
+            <a:endParaRPr lang="de-DE" sz="2000" dirty="0">
+              <a:latin typeface="Trebuchet MS" panose="020B0603020202020204" pitchFamily="34" charset="0"/>
+            </a:endParaRPr>
+          </a:p>
+          <a:p>
+            <a:pPr lvl="1"/>
+            <a:r>
+              <a:rPr lang="de-DE" sz="2000" dirty="0">
+                <a:latin typeface="Trebuchet MS" panose="020B0603020202020204" pitchFamily="34" charset="0"/>
+              </a:rPr>
+              <a:t>Ursprüngliche Implementierung mit „nur“ 4 Bewegungsrichtungen</a:t>
+            </a:r>
+          </a:p>
+          <a:p>
+            <a:pPr marL="457200" lvl="1" indent="0">
+              <a:buNone/>
+            </a:pPr>
+            <a:r>
+              <a:rPr lang="de-DE" sz="2000" dirty="0">
+                <a:latin typeface="Trebuchet MS" panose="020B0603020202020204" pitchFamily="34" charset="0"/>
+                <a:sym typeface="Wingdings" panose="05000000000000000000" pitchFamily="2" charset="2"/>
+              </a:rPr>
+              <a:t>	 Setzen von neuen Richtungen nach Kollisionen</a:t>
+            </a:r>
+          </a:p>
+          <a:p>
+            <a:endParaRPr lang="de-DE" dirty="0">
+              <a:latin typeface="Trebuchet MS" panose="020B0603020202020204" pitchFamily="34" charset="0"/>
+            </a:endParaRPr>
+          </a:p>
+        </p:txBody>
+      </p:sp>
+      <p:sp>
+        <p:nvSpPr>
+          <p:cNvPr id="4" name="Parallelogramm 3">
+            <a:extLst>
+              <a:ext uri="{FF2B5EF4-FFF2-40B4-BE49-F238E27FC236}">
+                <a16:creationId xmlns:a16="http://schemas.microsoft.com/office/drawing/2014/main" id="{AD5E9593-B066-4725-9DED-65CD2FA681C1}"/>
+              </a:ext>
+            </a:extLst>
+          </p:cNvPr>
+          <p:cNvSpPr/>
+          <p:nvPr/>
+        </p:nvSpPr>
+        <p:spPr>
+          <a:xfrm>
+            <a:off x="-330764" y="320406"/>
+            <a:ext cx="3978839" cy="566960"/>
+          </a:xfrm>
+          <a:prstGeom prst="parallelogram">
+            <a:avLst/>
+          </a:prstGeom>
+          <a:solidFill>
+            <a:srgbClr val="009E6F"/>
+          </a:solidFill>
+          <a:ln>
+            <a:solidFill>
+              <a:srgbClr val="009E6F"/>
+            </a:solidFill>
+          </a:ln>
+        </p:spPr>
+        <p:style>
+          <a:lnRef idx="2">
+            <a:schemeClr val="accent6">
+              <a:shade val="50000"/>
+            </a:schemeClr>
+          </a:lnRef>
+          <a:fillRef idx="1">
+            <a:schemeClr val="accent6"/>
+          </a:fillRef>
+          <a:effectRef idx="0">
+            <a:schemeClr val="accent6"/>
+          </a:effectRef>
+          <a:fontRef idx="minor">
+            <a:schemeClr val="lt1"/>
+          </a:fontRef>
+        </p:style>
+        <p:txBody>
+          <a:bodyPr rtlCol="0" anchor="ctr"/>
+          <a:lstStyle/>
+          <a:p>
+            <a:pPr marL="0" marR="0" lvl="0" indent="0" algn="ctr" defTabSz="914400" rtl="0" eaLnBrk="1" fontAlgn="auto" latinLnBrk="0" hangingPunct="1">
+              <a:lnSpc>
+                <a:spcPct val="100000"/>
+              </a:lnSpc>
+              <a:spcBef>
+                <a:spcPts val="0"/>
+              </a:spcBef>
+              <a:spcAft>
+                <a:spcPts val="0"/>
+              </a:spcAft>
+              <a:buClrTx/>
+              <a:buSzTx/>
+              <a:buFontTx/>
+              <a:buNone/>
+              <a:tabLst/>
+              <a:defRPr/>
+            </a:pPr>
+            <a:endParaRPr kumimoji="0" lang="de-DE" sz="1800" b="0" i="0" u="none" strike="noStrike" kern="1200" cap="none" spc="0" normalizeH="0" baseline="0" noProof="0">
+              <a:ln>
+                <a:noFill/>
+              </a:ln>
+              <a:solidFill>
+                <a:prstClr val="white"/>
+              </a:solidFill>
+              <a:effectLst/>
+              <a:uLnTx/>
+              <a:uFillTx/>
+              <a:latin typeface="Calibri" panose="020F0502020204030204"/>
+              <a:ea typeface="+mn-ea"/>
+              <a:cs typeface="+mn-cs"/>
+            </a:endParaRPr>
+          </a:p>
+        </p:txBody>
+      </p:sp>
+      <p:sp>
+        <p:nvSpPr>
+          <p:cNvPr id="5" name="Textfeld 4">
+            <a:extLst>
+              <a:ext uri="{FF2B5EF4-FFF2-40B4-BE49-F238E27FC236}">
+                <a16:creationId xmlns:a16="http://schemas.microsoft.com/office/drawing/2014/main" id="{8B7A21D5-F4E9-4BE8-8DC2-2EC659BD9782}"/>
+              </a:ext>
+            </a:extLst>
+          </p:cNvPr>
+          <p:cNvSpPr txBox="1"/>
+          <p:nvPr/>
+        </p:nvSpPr>
+        <p:spPr>
+          <a:xfrm>
+            <a:off x="-93722" y="403831"/>
+            <a:ext cx="3504753" cy="400110"/>
+          </a:xfrm>
+          <a:prstGeom prst="rect">
+            <a:avLst/>
+          </a:prstGeom>
+          <a:noFill/>
+        </p:spPr>
+        <p:txBody>
+          <a:bodyPr wrap="square" rtlCol="0">
+            <a:spAutoFit/>
+          </a:bodyPr>
+          <a:lstStyle/>
+          <a:p>
+            <a:pPr marL="0" marR="0" lvl="0" indent="0" algn="ctr" defTabSz="914400" rtl="0" eaLnBrk="1" fontAlgn="auto" latinLnBrk="0" hangingPunct="1">
+              <a:lnSpc>
+                <a:spcPct val="100000"/>
+              </a:lnSpc>
+              <a:spcBef>
+                <a:spcPts val="0"/>
+              </a:spcBef>
+              <a:spcAft>
+                <a:spcPts val="0"/>
+              </a:spcAft>
+              <a:buClrTx/>
+              <a:buSzTx/>
+              <a:buFontTx/>
+              <a:buNone/>
+              <a:tabLst/>
+              <a:defRPr/>
+            </a:pPr>
+            <a:r>
+              <a:rPr kumimoji="0" lang="de-DE" sz="2000" b="0" i="0" u="none" strike="noStrike" kern="1200" cap="none" spc="0" normalizeH="0" baseline="0" noProof="0" dirty="0">
+                <a:ln>
+                  <a:noFill/>
+                </a:ln>
+                <a:solidFill>
+                  <a:prstClr val="white"/>
+                </a:solidFill>
+                <a:effectLst/>
+                <a:uLnTx/>
+                <a:uFillTx/>
+                <a:latin typeface="Trebuchet MS" panose="020B0603020202020204" pitchFamily="34" charset="0"/>
+                <a:ea typeface="+mn-ea"/>
+                <a:cs typeface="+mn-cs"/>
+              </a:rPr>
+              <a:t>Schwierigkeiten</a:t>
+            </a:r>
+            <a:endParaRPr kumimoji="0" lang="de-DE" sz="1800" b="0" i="0" u="none" strike="noStrike" kern="1200" cap="none" spc="0" normalizeH="0" baseline="0" noProof="0" dirty="0">
+              <a:ln>
+                <a:noFill/>
+              </a:ln>
+              <a:solidFill>
+                <a:prstClr val="white"/>
+              </a:solidFill>
+              <a:effectLst/>
+              <a:uLnTx/>
+              <a:uFillTx/>
+              <a:latin typeface="Trebuchet MS" panose="020B0603020202020204" pitchFamily="34" charset="0"/>
+              <a:ea typeface="+mn-ea"/>
+              <a:cs typeface="+mn-cs"/>
+            </a:endParaRPr>
           </a:p>
         </p:txBody>
       </p:sp>
@@ -5579,34 +7446,6 @@
       </p:grpSpPr>
       <p:sp>
         <p:nvSpPr>
-          <p:cNvPr id="2" name="Titel 1">
-            <a:extLst>
-              <a:ext uri="{FF2B5EF4-FFF2-40B4-BE49-F238E27FC236}">
-                <a16:creationId xmlns:a16="http://schemas.microsoft.com/office/drawing/2014/main" id="{EA8D1BD3-F550-4A6B-B909-B54F54EA857C}"/>
-              </a:ext>
-            </a:extLst>
-          </p:cNvPr>
-          <p:cNvSpPr>
-            <a:spLocks noGrp="1"/>
-          </p:cNvSpPr>
-          <p:nvPr>
-            <p:ph type="title"/>
-          </p:nvPr>
-        </p:nvSpPr>
-        <p:spPr/>
-        <p:txBody>
-          <a:bodyPr/>
-          <a:lstStyle/>
-          <a:p>
-            <a:r>
-              <a:rPr lang="de-DE" dirty="0"/>
-              <a:t>Features</a:t>
-            </a:r>
-          </a:p>
-        </p:txBody>
-      </p:sp>
-      <p:sp>
-        <p:nvSpPr>
           <p:cNvPr id="3" name="Inhaltsplatzhalter 2">
             <a:extLst>
               <a:ext uri="{FF2B5EF4-FFF2-40B4-BE49-F238E27FC236}">
@@ -5621,112 +7460,474 @@
             <p:ph idx="1"/>
           </p:nvPr>
         </p:nvSpPr>
-        <p:spPr/>
-        <p:txBody>
-          <a:bodyPr/>
-          <a:lstStyle/>
-          <a:p>
-            <a:r>
-              <a:rPr lang="de-DE" dirty="0"/>
+        <p:spPr>
+          <a:xfrm>
+            <a:off x="838200" y="1609725"/>
+            <a:ext cx="10515600" cy="4724400"/>
+          </a:xfrm>
+        </p:spPr>
+        <p:txBody>
+          <a:bodyPr>
+            <a:normAutofit/>
+          </a:bodyPr>
+          <a:lstStyle/>
+          <a:p>
+            <a:r>
+              <a:rPr lang="de-DE" sz="2400" dirty="0">
+                <a:latin typeface="Trebuchet MS" panose="020B0603020202020204" pitchFamily="34" charset="0"/>
+              </a:rPr>
               <a:t>Modifizierungen</a:t>
             </a:r>
           </a:p>
           <a:p>
             <a:pPr lvl="1"/>
             <a:r>
-              <a:rPr lang="de-DE" dirty="0"/>
+              <a:rPr lang="de-DE" sz="2000" dirty="0">
+                <a:latin typeface="Trebuchet MS" panose="020B0603020202020204" pitchFamily="34" charset="0"/>
+              </a:rPr>
               <a:t>Social </a:t>
             </a:r>
             <a:r>
-              <a:rPr lang="de-DE" dirty="0" err="1"/>
+              <a:rPr lang="de-DE" sz="2000" dirty="0" err="1">
+                <a:latin typeface="Trebuchet MS" panose="020B0603020202020204" pitchFamily="34" charset="0"/>
+              </a:rPr>
               <a:t>Distancing</a:t>
             </a:r>
-            <a:endParaRPr lang="de-DE" dirty="0"/>
+            <a:endParaRPr lang="de-DE" sz="2000" dirty="0">
+              <a:latin typeface="Trebuchet MS" panose="020B0603020202020204" pitchFamily="34" charset="0"/>
+            </a:endParaRPr>
           </a:p>
           <a:p>
             <a:pPr lvl="1"/>
             <a:r>
-              <a:rPr lang="de-DE" dirty="0"/>
+              <a:rPr lang="de-DE" sz="2000" dirty="0">
+                <a:latin typeface="Trebuchet MS" panose="020B0603020202020204" pitchFamily="34" charset="0"/>
+              </a:rPr>
               <a:t>Impfungen</a:t>
             </a:r>
           </a:p>
           <a:p>
             <a:pPr lvl="1"/>
             <a:r>
-              <a:rPr lang="de-DE" dirty="0"/>
+              <a:rPr lang="de-DE" sz="2000" dirty="0">
+                <a:latin typeface="Trebuchet MS" panose="020B0603020202020204" pitchFamily="34" charset="0"/>
+              </a:rPr>
               <a:t>Überlastung des Gesundheitssystems</a:t>
             </a:r>
           </a:p>
           <a:p>
-            <a:r>
-              <a:rPr lang="de-DE" dirty="0"/>
+            <a:pPr marL="457200" lvl="1" indent="0">
+              <a:buNone/>
+            </a:pPr>
+            <a:endParaRPr lang="de-DE" sz="2000" dirty="0">
+              <a:latin typeface="Trebuchet MS" panose="020B0603020202020204" pitchFamily="34" charset="0"/>
+            </a:endParaRPr>
+          </a:p>
+          <a:p>
+            <a:r>
+              <a:rPr lang="de-DE" sz="2400" dirty="0">
+                <a:latin typeface="Trebuchet MS" panose="020B0603020202020204" pitchFamily="34" charset="0"/>
+              </a:rPr>
               <a:t>Anzeigen von…</a:t>
             </a:r>
           </a:p>
           <a:p>
             <a:pPr lvl="1"/>
             <a:r>
-              <a:rPr lang="de-DE" dirty="0"/>
+              <a:rPr lang="de-DE" sz="2000" dirty="0">
+                <a:latin typeface="Trebuchet MS" panose="020B0603020202020204" pitchFamily="34" charset="0"/>
+              </a:rPr>
               <a:t>Infektionsradius</a:t>
             </a:r>
           </a:p>
           <a:p>
             <a:pPr lvl="1"/>
             <a:r>
-              <a:rPr lang="de-DE" dirty="0"/>
+              <a:rPr lang="de-DE" sz="2000" dirty="0">
+                <a:latin typeface="Trebuchet MS" panose="020B0603020202020204" pitchFamily="34" charset="0"/>
+              </a:rPr>
               <a:t>Social </a:t>
             </a:r>
             <a:r>
-              <a:rPr lang="de-DE" dirty="0" err="1"/>
+              <a:rPr lang="de-DE" sz="2000" dirty="0" err="1">
+                <a:latin typeface="Trebuchet MS" panose="020B0603020202020204" pitchFamily="34" charset="0"/>
+              </a:rPr>
               <a:t>Distancing</a:t>
             </a:r>
             <a:r>
-              <a:rPr lang="de-DE" dirty="0"/>
+              <a:rPr lang="de-DE" sz="2000" dirty="0">
+                <a:latin typeface="Trebuchet MS" panose="020B0603020202020204" pitchFamily="34" charset="0"/>
+              </a:rPr>
               <a:t> Radius</a:t>
             </a:r>
           </a:p>
           <a:p>
-            <a:r>
-              <a:rPr lang="de-DE" dirty="0"/>
+            <a:pPr marL="457200" lvl="1" indent="0">
+              <a:buNone/>
+            </a:pPr>
+            <a:endParaRPr lang="de-DE" sz="2000" dirty="0">
+              <a:latin typeface="Trebuchet MS" panose="020B0603020202020204" pitchFamily="34" charset="0"/>
+            </a:endParaRPr>
+          </a:p>
+          <a:p>
+            <a:r>
+              <a:rPr lang="de-DE" sz="2400" dirty="0">
+                <a:latin typeface="Trebuchet MS" panose="020B0603020202020204" pitchFamily="34" charset="0"/>
+              </a:rPr>
               <a:t>Robustheit…</a:t>
             </a:r>
           </a:p>
           <a:p>
             <a:pPr lvl="1"/>
             <a:r>
-              <a:rPr lang="de-DE" dirty="0"/>
-              <a:t>…Abstimmung der Buttons</a:t>
+              <a:rPr lang="de-DE" sz="2000" dirty="0">
+                <a:latin typeface="Trebuchet MS" panose="020B0603020202020204" pitchFamily="34" charset="0"/>
+              </a:rPr>
+              <a:t>… Abstimmung der Buttons</a:t>
             </a:r>
           </a:p>
           <a:p>
             <a:pPr lvl="1"/>
             <a:r>
-              <a:rPr lang="de-DE" dirty="0"/>
-              <a:t>…</a:t>
-            </a:r>
-            <a:r>
-              <a:rPr lang="de-DE" dirty="0" err="1"/>
+              <a:rPr lang="de-DE" sz="2000" dirty="0">
+                <a:latin typeface="Trebuchet MS" panose="020B0603020202020204" pitchFamily="34" charset="0"/>
+              </a:rPr>
+              <a:t>… </a:t>
+            </a:r>
+            <a:r>
+              <a:rPr lang="de-DE" sz="2000" dirty="0" err="1">
+                <a:latin typeface="Trebuchet MS" panose="020B0603020202020204" pitchFamily="34" charset="0"/>
+              </a:rPr>
               <a:t>Enable</a:t>
             </a:r>
             <a:r>
-              <a:rPr lang="de-DE" dirty="0"/>
+              <a:rPr lang="de-DE" sz="2000" dirty="0">
+                <a:latin typeface="Trebuchet MS" panose="020B0603020202020204" pitchFamily="34" charset="0"/>
+              </a:rPr>
               <a:t>/</a:t>
             </a:r>
             <a:r>
-              <a:rPr lang="de-DE" dirty="0" err="1"/>
+              <a:rPr lang="de-DE" sz="2000" dirty="0" err="1">
+                <a:latin typeface="Trebuchet MS" panose="020B0603020202020204" pitchFamily="34" charset="0"/>
+              </a:rPr>
               <a:t>Disable</a:t>
             </a:r>
             <a:r>
-              <a:rPr lang="de-DE" dirty="0"/>
+              <a:rPr lang="de-DE" sz="2000" dirty="0">
+                <a:latin typeface="Trebuchet MS" panose="020B0603020202020204" pitchFamily="34" charset="0"/>
+              </a:rPr>
               <a:t> der Einstellungsmöglichkeiten</a:t>
             </a:r>
           </a:p>
           <a:p>
             <a:pPr lvl="1"/>
-            <a:endParaRPr lang="de-DE" dirty="0"/>
-          </a:p>
-        </p:txBody>
-      </p:sp>
+            <a:r>
+              <a:rPr lang="de-DE" sz="2000" dirty="0">
+                <a:latin typeface="Trebuchet MS" panose="020B0603020202020204" pitchFamily="34" charset="0"/>
+              </a:rPr>
+              <a:t>… Eingabe von Parametern</a:t>
+            </a:r>
+          </a:p>
+          <a:p>
+            <a:pPr lvl="1"/>
+            <a:endParaRPr lang="de-DE" dirty="0">
+              <a:latin typeface="Trebuchet MS" panose="020B0603020202020204" pitchFamily="34" charset="0"/>
+            </a:endParaRPr>
+          </a:p>
+        </p:txBody>
+      </p:sp>
+      <p:sp>
+        <p:nvSpPr>
+          <p:cNvPr id="6" name="Parallelogramm 5">
+            <a:extLst>
+              <a:ext uri="{FF2B5EF4-FFF2-40B4-BE49-F238E27FC236}">
+                <a16:creationId xmlns:a16="http://schemas.microsoft.com/office/drawing/2014/main" id="{10807667-ADC1-4C8F-9F1D-704AF80F9358}"/>
+              </a:ext>
+            </a:extLst>
+          </p:cNvPr>
+          <p:cNvSpPr/>
+          <p:nvPr/>
+        </p:nvSpPr>
+        <p:spPr>
+          <a:xfrm>
+            <a:off x="-330764" y="320406"/>
+            <a:ext cx="3978839" cy="566960"/>
+          </a:xfrm>
+          <a:prstGeom prst="parallelogram">
+            <a:avLst/>
+          </a:prstGeom>
+          <a:solidFill>
+            <a:srgbClr val="009E6F"/>
+          </a:solidFill>
+          <a:ln>
+            <a:solidFill>
+              <a:srgbClr val="009E6F"/>
+            </a:solidFill>
+          </a:ln>
+        </p:spPr>
+        <p:style>
+          <a:lnRef idx="2">
+            <a:schemeClr val="accent6">
+              <a:shade val="50000"/>
+            </a:schemeClr>
+          </a:lnRef>
+          <a:fillRef idx="1">
+            <a:schemeClr val="accent6"/>
+          </a:fillRef>
+          <a:effectRef idx="0">
+            <a:schemeClr val="accent6"/>
+          </a:effectRef>
+          <a:fontRef idx="minor">
+            <a:schemeClr val="lt1"/>
+          </a:fontRef>
+        </p:style>
+        <p:txBody>
+          <a:bodyPr rtlCol="0" anchor="ctr"/>
+          <a:lstStyle/>
+          <a:p>
+            <a:pPr marL="0" marR="0" lvl="0" indent="0" algn="ctr" defTabSz="914400" rtl="0" eaLnBrk="1" fontAlgn="auto" latinLnBrk="0" hangingPunct="1">
+              <a:lnSpc>
+                <a:spcPct val="100000"/>
+              </a:lnSpc>
+              <a:spcBef>
+                <a:spcPts val="0"/>
+              </a:spcBef>
+              <a:spcAft>
+                <a:spcPts val="0"/>
+              </a:spcAft>
+              <a:buClrTx/>
+              <a:buSzTx/>
+              <a:buFontTx/>
+              <a:buNone/>
+              <a:tabLst/>
+              <a:defRPr/>
+            </a:pPr>
+            <a:endParaRPr kumimoji="0" lang="de-DE" sz="1800" b="0" i="0" u="none" strike="noStrike" kern="1200" cap="none" spc="0" normalizeH="0" baseline="0" noProof="0">
+              <a:ln>
+                <a:noFill/>
+              </a:ln>
+              <a:solidFill>
+                <a:prstClr val="white"/>
+              </a:solidFill>
+              <a:effectLst/>
+              <a:uLnTx/>
+              <a:uFillTx/>
+              <a:latin typeface="Calibri" panose="020F0502020204030204"/>
+              <a:ea typeface="+mn-ea"/>
+              <a:cs typeface="+mn-cs"/>
+            </a:endParaRPr>
+          </a:p>
+        </p:txBody>
+      </p:sp>
+      <p:sp>
+        <p:nvSpPr>
+          <p:cNvPr id="7" name="Textfeld 6">
+            <a:extLst>
+              <a:ext uri="{FF2B5EF4-FFF2-40B4-BE49-F238E27FC236}">
+                <a16:creationId xmlns:a16="http://schemas.microsoft.com/office/drawing/2014/main" id="{E7F97A4A-BC43-458F-B9A9-359F26E3E7CE}"/>
+              </a:ext>
+            </a:extLst>
+          </p:cNvPr>
+          <p:cNvSpPr txBox="1"/>
+          <p:nvPr/>
+        </p:nvSpPr>
+        <p:spPr>
+          <a:xfrm>
+            <a:off x="-93722" y="403831"/>
+            <a:ext cx="3504753" cy="400110"/>
+          </a:xfrm>
+          <a:prstGeom prst="rect">
+            <a:avLst/>
+          </a:prstGeom>
+          <a:noFill/>
+        </p:spPr>
+        <p:txBody>
+          <a:bodyPr wrap="square" rtlCol="0">
+            <a:spAutoFit/>
+          </a:bodyPr>
+          <a:lstStyle/>
+          <a:p>
+            <a:pPr marL="0" marR="0" lvl="0" indent="0" algn="ctr" defTabSz="914400" rtl="0" eaLnBrk="1" fontAlgn="auto" latinLnBrk="0" hangingPunct="1">
+              <a:lnSpc>
+                <a:spcPct val="100000"/>
+              </a:lnSpc>
+              <a:spcBef>
+                <a:spcPts val="0"/>
+              </a:spcBef>
+              <a:spcAft>
+                <a:spcPts val="0"/>
+              </a:spcAft>
+              <a:buClrTx/>
+              <a:buSzTx/>
+              <a:buFontTx/>
+              <a:buNone/>
+              <a:tabLst/>
+              <a:defRPr/>
+            </a:pPr>
+            <a:r>
+              <a:rPr kumimoji="0" lang="de-DE" sz="2000" b="0" i="0" u="none" strike="noStrike" kern="1200" cap="none" spc="0" normalizeH="0" baseline="0" noProof="0" dirty="0">
+                <a:ln>
+                  <a:noFill/>
+                </a:ln>
+                <a:solidFill>
+                  <a:prstClr val="white"/>
+                </a:solidFill>
+                <a:effectLst/>
+                <a:uLnTx/>
+                <a:uFillTx/>
+                <a:latin typeface="Trebuchet MS" panose="020B0603020202020204" pitchFamily="34" charset="0"/>
+                <a:ea typeface="+mn-ea"/>
+                <a:cs typeface="+mn-cs"/>
+              </a:rPr>
+              <a:t>Features</a:t>
+            </a:r>
+            <a:endParaRPr kumimoji="0" lang="de-DE" sz="1800" b="0" i="0" u="none" strike="noStrike" kern="1200" cap="none" spc="0" normalizeH="0" baseline="0" noProof="0" dirty="0">
+              <a:ln>
+                <a:noFill/>
+              </a:ln>
+              <a:solidFill>
+                <a:prstClr val="white"/>
+              </a:solidFill>
+              <a:effectLst/>
+              <a:uLnTx/>
+              <a:uFillTx/>
+              <a:latin typeface="Trebuchet MS" panose="020B0603020202020204" pitchFamily="34" charset="0"/>
+              <a:ea typeface="+mn-ea"/>
+              <a:cs typeface="+mn-cs"/>
+            </a:endParaRPr>
+          </a:p>
+        </p:txBody>
+      </p:sp>
+      <p:pic>
+        <p:nvPicPr>
+          <p:cNvPr id="9" name="Grafik 8">
+            <a:extLst>
+              <a:ext uri="{FF2B5EF4-FFF2-40B4-BE49-F238E27FC236}">
+                <a16:creationId xmlns:a16="http://schemas.microsoft.com/office/drawing/2014/main" id="{62431FBD-FF3C-44ED-A817-4E4E36BC08CB}"/>
+              </a:ext>
+            </a:extLst>
+          </p:cNvPr>
+          <p:cNvPicPr>
+            <a:picLocks noChangeAspect="1"/>
+          </p:cNvPicPr>
+          <p:nvPr/>
+        </p:nvPicPr>
+        <p:blipFill>
+          <a:blip r:embed="rId2"/>
+          <a:stretch>
+            <a:fillRect/>
+          </a:stretch>
+        </p:blipFill>
+        <p:spPr>
+          <a:xfrm>
+            <a:off x="6019800" y="1347119"/>
+            <a:ext cx="4800600" cy="1427831"/>
+          </a:xfrm>
+          <a:prstGeom prst="rect">
+            <a:avLst/>
+          </a:prstGeom>
+          <a:ln w="19050">
+            <a:solidFill>
+              <a:srgbClr val="009E6F"/>
+            </a:solidFill>
+          </a:ln>
+        </p:spPr>
+      </p:pic>
+      <p:pic>
+        <p:nvPicPr>
+          <p:cNvPr id="10" name="Grafik 9">
+            <a:extLst>
+              <a:ext uri="{FF2B5EF4-FFF2-40B4-BE49-F238E27FC236}">
+                <a16:creationId xmlns:a16="http://schemas.microsoft.com/office/drawing/2014/main" id="{99268262-E68A-46FD-83A7-3DC5A492DE54}"/>
+              </a:ext>
+            </a:extLst>
+          </p:cNvPr>
+          <p:cNvPicPr>
+            <a:picLocks noChangeAspect="1"/>
+          </p:cNvPicPr>
+          <p:nvPr/>
+        </p:nvPicPr>
+        <p:blipFill>
+          <a:blip r:embed="rId3"/>
+          <a:stretch>
+            <a:fillRect/>
+          </a:stretch>
+        </p:blipFill>
+        <p:spPr>
+          <a:xfrm>
+            <a:off x="5543550" y="3568153"/>
+            <a:ext cx="2865322" cy="873028"/>
+          </a:xfrm>
+          <a:prstGeom prst="rect">
+            <a:avLst/>
+          </a:prstGeom>
+          <a:ln w="19050">
+            <a:solidFill>
+              <a:srgbClr val="009E6F"/>
+            </a:solidFill>
+          </a:ln>
+        </p:spPr>
+      </p:pic>
+      <p:pic>
+        <p:nvPicPr>
+          <p:cNvPr id="12" name="Grafik 11">
+            <a:extLst>
+              <a:ext uri="{FF2B5EF4-FFF2-40B4-BE49-F238E27FC236}">
+                <a16:creationId xmlns:a16="http://schemas.microsoft.com/office/drawing/2014/main" id="{E671A4D3-047E-4829-A90E-FF274D9CCF3B}"/>
+              </a:ext>
+            </a:extLst>
+          </p:cNvPr>
+          <p:cNvPicPr>
+            <a:picLocks noChangeAspect="1"/>
+          </p:cNvPicPr>
+          <p:nvPr/>
+        </p:nvPicPr>
+        <p:blipFill>
+          <a:blip r:embed="rId4"/>
+          <a:stretch>
+            <a:fillRect/>
+          </a:stretch>
+        </p:blipFill>
+        <p:spPr>
+          <a:xfrm>
+            <a:off x="8863461" y="3429000"/>
+            <a:ext cx="762574" cy="693249"/>
+          </a:xfrm>
+          <a:prstGeom prst="rect">
+            <a:avLst/>
+          </a:prstGeom>
+        </p:spPr>
+      </p:pic>
+      <p:pic>
+        <p:nvPicPr>
+          <p:cNvPr id="14" name="Grafik 13">
+            <a:extLst>
+              <a:ext uri="{FF2B5EF4-FFF2-40B4-BE49-F238E27FC236}">
+                <a16:creationId xmlns:a16="http://schemas.microsoft.com/office/drawing/2014/main" id="{B306B0EC-30CD-4CEB-9662-E2FA173E5504}"/>
+              </a:ext>
+            </a:extLst>
+          </p:cNvPr>
+          <p:cNvPicPr>
+            <a:picLocks noChangeAspect="1"/>
+          </p:cNvPicPr>
+          <p:nvPr/>
+        </p:nvPicPr>
+        <p:blipFill>
+          <a:blip r:embed="rId5"/>
+          <a:stretch>
+            <a:fillRect/>
+          </a:stretch>
+        </p:blipFill>
+        <p:spPr>
+          <a:xfrm>
+            <a:off x="9626035" y="3866298"/>
+            <a:ext cx="575726" cy="575726"/>
+          </a:xfrm>
+          <a:prstGeom prst="rect">
+            <a:avLst/>
+          </a:prstGeom>
+        </p:spPr>
+      </p:pic>
     </p:spTree>
     <p:extLst>
       <p:ext uri="{BB962C8B-B14F-4D97-AF65-F5344CB8AC3E}">

</xml_diff>